<commit_message>
change in some modules, DDBB query
</commit_message>
<xml_diff>
--- a/server/public/descarga/CONTROL DE INYECCION.pptx
+++ b/server/public/descarga/CONTROL DE INYECCION.pptx
@@ -5,7 +5,7 @@
     <p:sldMasterId id="2147483648" r:id="rId1"/>
   </p:sldMasterIdLst>
   <p:notesMasterIdLst>
-    <p:notesMasterId r:id="rId11"/>
+    <p:notesMasterId r:id="rId12"/>
   </p:notesMasterIdLst>
   <p:sldIdLst>
     <p:sldId id="262" r:id="rId2"/>
@@ -15,8 +15,9 @@
     <p:sldId id="288" r:id="rId6"/>
     <p:sldId id="289" r:id="rId7"/>
     <p:sldId id="291" r:id="rId8"/>
-    <p:sldId id="286" r:id="rId9"/>
-    <p:sldId id="280" r:id="rId10"/>
+    <p:sldId id="293" r:id="rId9"/>
+    <p:sldId id="286" r:id="rId10"/>
+    <p:sldId id="280" r:id="rId11"/>
   </p:sldIdLst>
   <p:sldSz cx="9144000" cy="5143500" type="screen16x9"/>
   <p:notesSz cx="6858000" cy="9144000"/>
@@ -117,7 +118,7 @@
   </p:defaultTextStyle>
   <p:extLst>
     <p:ext uri="{EFAFB233-063F-42B5-8137-9DF3F51BA10A}">
-      <p15:sldGuideLst xmlns:p15="http://schemas.microsoft.com/office/powerpoint/2012/main" xmlns="">
+      <p15:sldGuideLst xmlns="" xmlns:p15="http://schemas.microsoft.com/office/powerpoint/2012/main">
         <p15:guide id="1" orient="horz" pos="1620">
           <p15:clr>
             <a:srgbClr val="A4A3A4"/>
@@ -388,7 +389,7 @@
     </p:spTree>
     <p:extLst>
       <p:ext uri="{BB962C8B-B14F-4D97-AF65-F5344CB8AC3E}">
-        <p14:creationId xmlns:p14="http://schemas.microsoft.com/office/powerpoint/2010/main" xmlns="" val="4059829114"/>
+        <p14:creationId xmlns="" xmlns:p14="http://schemas.microsoft.com/office/powerpoint/2010/main" val="4059829114"/>
       </p:ext>
     </p:extLst>
   </p:cSld>
@@ -563,7 +564,7 @@
     </p:spTree>
     <p:extLst>
       <p:ext uri="{BB962C8B-B14F-4D97-AF65-F5344CB8AC3E}">
-        <p14:creationId xmlns:p14="http://schemas.microsoft.com/office/powerpoint/2010/main" xmlns="" val="2007085829"/>
+        <p14:creationId xmlns="" xmlns:p14="http://schemas.microsoft.com/office/powerpoint/2010/main" val="2007085829"/>
       </p:ext>
     </p:extLst>
   </p:cSld>
@@ -755,7 +756,7 @@
             <a:fld id="{534F3C69-B5E2-49EF-A7EA-82683B09476F}" type="datetime10">
               <a:rPr lang="es-CL" smtClean="0"/>
               <a:pPr/>
-              <a:t>10:23</a:t>
+              <a:t>14:06</a:t>
             </a:fld>
             <a:endParaRPr lang="es-CL" dirty="0"/>
           </a:p>
@@ -922,7 +923,7 @@
             <a:fld id="{5918D9F3-AB08-4DD8-A398-4FD732BE0B80}" type="datetime10">
               <a:rPr lang="es-CL" smtClean="0"/>
               <a:pPr/>
-              <a:t>10:23</a:t>
+              <a:t>14:06</a:t>
             </a:fld>
             <a:endParaRPr lang="es-CL" dirty="0"/>
           </a:p>
@@ -1099,7 +1100,7 @@
             <a:fld id="{0179EB63-EE89-4467-890C-637122058D05}" type="datetime10">
               <a:rPr lang="es-CL" smtClean="0"/>
               <a:pPr/>
-              <a:t>10:23</a:t>
+              <a:t>14:06</a:t>
             </a:fld>
             <a:endParaRPr lang="es-CL" dirty="0"/>
           </a:p>
@@ -1266,7 +1267,7 @@
             <a:fld id="{D509CB46-7F35-4ED8-B4EB-7D2059EFAEEF}" type="datetime10">
               <a:rPr lang="es-CL" smtClean="0"/>
               <a:pPr/>
-              <a:t>10:23</a:t>
+              <a:t>14:06</a:t>
             </a:fld>
             <a:endParaRPr lang="es-CL" dirty="0"/>
           </a:p>
@@ -1509,7 +1510,7 @@
             <a:fld id="{9795A644-8607-49EC-B1E9-A67B1C842916}" type="datetime10">
               <a:rPr lang="es-CL" smtClean="0"/>
               <a:pPr/>
-              <a:t>10:23</a:t>
+              <a:t>14:06</a:t>
             </a:fld>
             <a:endParaRPr lang="es-CL" dirty="0"/>
           </a:p>
@@ -1794,7 +1795,7 @@
             <a:fld id="{78FE0365-E3EF-498B-9419-0AD17622A94C}" type="datetime10">
               <a:rPr lang="es-CL" smtClean="0"/>
               <a:pPr/>
-              <a:t>10:23</a:t>
+              <a:t>14:06</a:t>
             </a:fld>
             <a:endParaRPr lang="es-CL" dirty="0"/>
           </a:p>
@@ -2213,7 +2214,7 @@
             <a:fld id="{BAC6A1AB-92A5-46A0-8FC8-697DBF3B4924}" type="datetime10">
               <a:rPr lang="es-CL" smtClean="0"/>
               <a:pPr/>
-              <a:t>10:23</a:t>
+              <a:t>14:06</a:t>
             </a:fld>
             <a:endParaRPr lang="es-CL" dirty="0"/>
           </a:p>
@@ -2328,7 +2329,7 @@
             <a:fld id="{7CAB167F-FDC6-48E1-B8A9-8135CE164B66}" type="datetime10">
               <a:rPr lang="es-CL" smtClean="0"/>
               <a:pPr/>
-              <a:t>10:23</a:t>
+              <a:t>14:06</a:t>
             </a:fld>
             <a:endParaRPr lang="es-CL" dirty="0"/>
           </a:p>
@@ -2420,7 +2421,7 @@
             <a:fld id="{AFB840BB-B73C-4455-8A7C-CC1F135B5E2A}" type="datetime10">
               <a:rPr lang="es-CL" smtClean="0"/>
               <a:pPr/>
-              <a:t>10:23</a:t>
+              <a:t>14:06</a:t>
             </a:fld>
             <a:endParaRPr lang="es-CL" dirty="0"/>
           </a:p>
@@ -2694,7 +2695,7 @@
             <a:fld id="{2655B033-F939-4C6A-A134-888779C9E150}" type="datetime10">
               <a:rPr lang="es-CL" smtClean="0"/>
               <a:pPr/>
-              <a:t>10:23</a:t>
+              <a:t>14:06</a:t>
             </a:fld>
             <a:endParaRPr lang="es-CL" dirty="0"/>
           </a:p>
@@ -2944,7 +2945,7 @@
             <a:fld id="{024E23C4-2E88-4494-888B-47C7EA0E49C4}" type="datetime10">
               <a:rPr lang="es-CL" smtClean="0"/>
               <a:pPr/>
-              <a:t>10:23</a:t>
+              <a:t>14:06</a:t>
             </a:fld>
             <a:endParaRPr lang="es-CL" dirty="0"/>
           </a:p>
@@ -3011,7 +3012,7 @@
             <a:lum/>
             <a:extLst>
               <a:ext uri="{28A0092B-C50C-407E-A947-70E740481C1C}">
-                <a14:useLocalDpi xmlns:a14="http://schemas.microsoft.com/office/drawing/2010/main" xmlns=""/>
+                <a14:useLocalDpi xmlns="" xmlns:a14="http://schemas.microsoft.com/office/drawing/2010/main"/>
               </a:ext>
             </a:extLst>
           </a:blip>
@@ -3168,7 +3169,7 @@
             <a:fld id="{714D2EFB-0917-425C-BF3A-88B298A85C64}" type="datetime10">
               <a:rPr lang="es-CL" smtClean="0"/>
               <a:pPr/>
-              <a:t>10:23</a:t>
+              <a:t>14:06</a:t>
             </a:fld>
             <a:endParaRPr lang="es-CL" dirty="0"/>
           </a:p>
@@ -3533,7 +3534,7 @@
             <a:lum/>
             <a:extLst>
               <a:ext uri="{28A0092B-C50C-407E-A947-70E740481C1C}">
-                <a14:useLocalDpi xmlns:a14="http://schemas.microsoft.com/office/drawing/2010/main" xmlns=""/>
+                <a14:useLocalDpi xmlns="" xmlns:a14="http://schemas.microsoft.com/office/drawing/2010/main"/>
               </a:ext>
             </a:extLst>
           </a:blip>
@@ -3717,30 +3718,6 @@
       </p:cxnSp>
       <p:sp>
         <p:nvSpPr>
-          <p:cNvPr id="6" name="5 Marcador de fecha"/>
-          <p:cNvSpPr>
-            <a:spLocks noGrp="1"/>
-          </p:cNvSpPr>
-          <p:nvPr>
-            <p:ph type="dt" sz="half" idx="10"/>
-          </p:nvPr>
-        </p:nvSpPr>
-        <p:spPr/>
-        <p:txBody>
-          <a:bodyPr/>
-          <a:lstStyle/>
-          <a:p>
-            <a:fld id="{785D6BDC-FCF1-43FD-86E9-7682EED25E56}" type="datetime10">
-              <a:rPr lang="es-CL" smtClean="0"/>
-              <a:pPr/>
-              <a:t>10:23</a:t>
-            </a:fld>
-            <a:endParaRPr lang="es-CL" dirty="0"/>
-          </a:p>
-        </p:txBody>
-      </p:sp>
-      <p:sp>
-        <p:nvSpPr>
           <p:cNvPr id="7" name="6 CuadroTexto"/>
           <p:cNvSpPr txBox="1"/>
           <p:nvPr/>
@@ -3794,6 +3771,192 @@
   <p:transition>
     <p:fade/>
   </p:transition>
+  <p:timing>
+    <p:tnLst>
+      <p:par>
+        <p:cTn id="1" dur="indefinite" restart="never" nodeType="tmRoot"/>
+      </p:par>
+    </p:tnLst>
+  </p:timing>
+</p:sld>
+</file>
+
+<file path=ppt/slides/slide10.xml><?xml version="1.0" encoding="utf-8"?>
+<p:sld xmlns:a="http://schemas.openxmlformats.org/drawingml/2006/main" xmlns:r="http://schemas.openxmlformats.org/officeDocument/2006/relationships" xmlns:p="http://schemas.openxmlformats.org/presentationml/2006/main">
+  <p:cSld>
+    <p:spTree>
+      <p:nvGrpSpPr>
+        <p:cNvPr id="1" name=""/>
+        <p:cNvGrpSpPr/>
+        <p:nvPr/>
+      </p:nvGrpSpPr>
+      <p:grpSpPr>
+        <a:xfrm>
+          <a:off x="0" y="0"/>
+          <a:ext cx="0" cy="0"/>
+          <a:chOff x="0" y="0"/>
+          <a:chExt cx="0" cy="0"/>
+        </a:xfrm>
+      </p:grpSpPr>
+      <p:pic>
+        <p:nvPicPr>
+          <p:cNvPr id="5122" name="Picture 2"/>
+          <p:cNvPicPr>
+            <a:picLocks noChangeAspect="1" noChangeArrowheads="1"/>
+          </p:cNvPicPr>
+          <p:nvPr/>
+        </p:nvPicPr>
+        <p:blipFill>
+          <a:blip r:embed="rId2" cstate="print"/>
+          <a:srcRect/>
+          <a:stretch>
+            <a:fillRect/>
+          </a:stretch>
+        </p:blipFill>
+        <p:spPr bwMode="auto">
+          <a:xfrm>
+            <a:off x="0" y="3086100"/>
+            <a:ext cx="9144000" cy="2057400"/>
+          </a:xfrm>
+          <a:prstGeom prst="rect">
+            <a:avLst/>
+          </a:prstGeom>
+          <a:noFill/>
+          <a:ln w="9525">
+            <a:noFill/>
+            <a:miter lim="800000"/>
+            <a:headEnd/>
+            <a:tailEnd/>
+          </a:ln>
+        </p:spPr>
+      </p:pic>
+      <p:sp>
+        <p:nvSpPr>
+          <p:cNvPr id="2" name="1 Título"/>
+          <p:cNvSpPr>
+            <a:spLocks noGrp="1"/>
+          </p:cNvSpPr>
+          <p:nvPr>
+            <p:ph type="title"/>
+          </p:nvPr>
+        </p:nvSpPr>
+        <p:spPr>
+          <a:xfrm>
+            <a:off x="457200" y="571492"/>
+            <a:ext cx="8229600" cy="857250"/>
+          </a:xfrm>
+        </p:spPr>
+        <p:txBody>
+          <a:bodyPr/>
+          <a:lstStyle/>
+          <a:p>
+            <a:r>
+              <a:rPr lang="es-CL" dirty="0"/>
+              <a:t>FIN PRESENTACION</a:t>
+            </a:r>
+          </a:p>
+        </p:txBody>
+      </p:sp>
+      <p:sp>
+        <p:nvSpPr>
+          <p:cNvPr id="4" name="3 Marcador de fecha"/>
+          <p:cNvSpPr>
+            <a:spLocks noGrp="1"/>
+          </p:cNvSpPr>
+          <p:nvPr>
+            <p:ph type="dt" sz="half" idx="10"/>
+          </p:nvPr>
+        </p:nvSpPr>
+        <p:spPr/>
+        <p:txBody>
+          <a:bodyPr/>
+          <a:lstStyle/>
+          <a:p>
+            <a:fld id="{63E2D962-5AE3-40CF-95FD-860FC163C788}" type="datetime10">
+              <a:rPr lang="es-CL" smtClean="0"/>
+              <a:pPr/>
+              <a:t>14:42</a:t>
+            </a:fld>
+            <a:endParaRPr lang="es-CL" dirty="0"/>
+          </a:p>
+        </p:txBody>
+      </p:sp>
+      <p:pic>
+        <p:nvPicPr>
+          <p:cNvPr id="1029" name="Picture 5"/>
+          <p:cNvPicPr>
+            <a:picLocks noChangeAspect="1" noChangeArrowheads="1"/>
+          </p:cNvPicPr>
+          <p:nvPr/>
+        </p:nvPicPr>
+        <p:blipFill>
+          <a:blip r:embed="rId3" cstate="print">
+            <a:extLst>
+              <a:ext uri="{28A0092B-C50C-407E-A947-70E740481C1C}">
+                <a14:useLocalDpi xmlns="" xmlns:a14="http://schemas.microsoft.com/office/drawing/2010/main" val="0"/>
+              </a:ext>
+            </a:extLst>
+          </a:blip>
+          <a:srcRect/>
+          <a:stretch>
+            <a:fillRect/>
+          </a:stretch>
+        </p:blipFill>
+        <p:spPr bwMode="auto">
+          <a:xfrm>
+            <a:off x="-396552" y="1779662"/>
+            <a:ext cx="3106936" cy="3106936"/>
+          </a:xfrm>
+          <a:prstGeom prst="rect">
+            <a:avLst/>
+          </a:prstGeom>
+          <a:noFill/>
+          <a:ln>
+            <a:noFill/>
+          </a:ln>
+          <a:effectLst/>
+          <a:extLst>
+            <a:ext uri="{909E8E84-426E-40DD-AFC4-6F175D3DCCD1}">
+              <a14:hiddenFill xmlns="" xmlns:a14="http://schemas.microsoft.com/office/drawing/2010/main">
+                <a:solidFill>
+                  <a:schemeClr val="accent1"/>
+                </a:solidFill>
+              </a14:hiddenFill>
+            </a:ext>
+            <a:ext uri="{91240B29-F687-4F45-9708-019B960494DF}">
+              <a14:hiddenLine xmlns="" xmlns:a14="http://schemas.microsoft.com/office/drawing/2010/main" w="9525">
+                <a:solidFill>
+                  <a:schemeClr val="tx1"/>
+                </a:solidFill>
+                <a:miter lim="800000"/>
+                <a:headEnd/>
+                <a:tailEnd/>
+              </a14:hiddenLine>
+            </a:ext>
+            <a:ext uri="{AF507438-7753-43E0-B8FC-AC1667EBCBE1}">
+              <a14:hiddenEffects xmlns="" xmlns:a14="http://schemas.microsoft.com/office/drawing/2010/main">
+                <a:effectLst>
+                  <a:outerShdw dist="35921" dir="2700000" algn="ctr" rotWithShape="0">
+                    <a:schemeClr val="bg2"/>
+                  </a:outerShdw>
+                </a:effectLst>
+              </a14:hiddenEffects>
+            </a:ext>
+          </a:extLst>
+        </p:spPr>
+      </p:pic>
+    </p:spTree>
+  </p:cSld>
+  <p:clrMapOvr>
+    <a:masterClrMapping/>
+  </p:clrMapOvr>
+  <p:timing>
+    <p:tnLst>
+      <p:par>
+        <p:cTn id="1" dur="indefinite" restart="never" nodeType="tmRoot"/>
+      </p:par>
+    </p:tnLst>
+  </p:timing>
 </p:sld>
 </file>
 
@@ -3816,30 +3979,6 @@
       </p:grpSpPr>
       <p:sp>
         <p:nvSpPr>
-          <p:cNvPr id="4" name="3 Marcador de fecha"/>
-          <p:cNvSpPr>
-            <a:spLocks noGrp="1"/>
-          </p:cNvSpPr>
-          <p:nvPr>
-            <p:ph type="dt" sz="half" idx="10"/>
-          </p:nvPr>
-        </p:nvSpPr>
-        <p:spPr/>
-        <p:txBody>
-          <a:bodyPr/>
-          <a:lstStyle/>
-          <a:p>
-            <a:fld id="{D509CB46-7F35-4ED8-B4EB-7D2059EFAEEF}" type="datetime10">
-              <a:rPr lang="es-CL" smtClean="0"/>
-              <a:pPr/>
-              <a:t>10:24</a:t>
-            </a:fld>
-            <a:endParaRPr lang="es-CL" dirty="0"/>
-          </a:p>
-        </p:txBody>
-      </p:sp>
-      <p:sp>
-        <p:nvSpPr>
           <p:cNvPr id="5" name="4 CuadroTexto"/>
           <p:cNvSpPr txBox="1"/>
           <p:nvPr/>
@@ -3965,6 +4104,13 @@
   <p:clrMapOvr>
     <a:masterClrMapping/>
   </p:clrMapOvr>
+  <p:timing>
+    <p:tnLst>
+      <p:par>
+        <p:cTn id="1" dur="indefinite" restart="never" nodeType="tmRoot"/>
+      </p:par>
+    </p:tnLst>
+  </p:timing>
 </p:sld>
 </file>
 
@@ -4007,30 +4153,6 @@
           </a:p>
         </p:txBody>
       </p:sp>
-      <p:sp>
-        <p:nvSpPr>
-          <p:cNvPr id="4" name="3 Marcador de fecha"/>
-          <p:cNvSpPr>
-            <a:spLocks noGrp="1"/>
-          </p:cNvSpPr>
-          <p:nvPr>
-            <p:ph type="dt" sz="half" idx="10"/>
-          </p:nvPr>
-        </p:nvSpPr>
-        <p:spPr/>
-        <p:txBody>
-          <a:bodyPr/>
-          <a:lstStyle/>
-          <a:p>
-            <a:fld id="{D509CB46-7F35-4ED8-B4EB-7D2059EFAEEF}" type="datetime10">
-              <a:rPr lang="es-CL" smtClean="0"/>
-              <a:pPr/>
-              <a:t>10:28</a:t>
-            </a:fld>
-            <a:endParaRPr lang="es-CL" dirty="0"/>
-          </a:p>
-        </p:txBody>
-      </p:sp>
       <p:pic>
         <p:nvPicPr>
           <p:cNvPr id="7" name="6 Imagen" descr="F:\Imágenes\proyecto logo copia.png"/>
@@ -4061,9 +4183,39 @@
           </a:ln>
         </p:spPr>
       </p:pic>
+      <p:sp>
+        <p:nvSpPr>
+          <p:cNvPr id="9" name="8 CuadroTexto"/>
+          <p:cNvSpPr txBox="1"/>
+          <p:nvPr/>
+        </p:nvSpPr>
+        <p:spPr>
+          <a:xfrm>
+            <a:off x="4427984" y="1707654"/>
+            <a:ext cx="3960440" cy="646331"/>
+          </a:xfrm>
+          <a:prstGeom prst="rect">
+            <a:avLst/>
+          </a:prstGeom>
+          <a:noFill/>
+        </p:spPr>
+        <p:txBody>
+          <a:bodyPr wrap="square" rtlCol="0">
+            <a:spAutoFit/>
+          </a:bodyPr>
+          <a:lstStyle/>
+          <a:p>
+            <a:r>
+              <a:rPr lang="es-CL" dirty="0" smtClean="0"/>
+              <a:t>Aplicación web de registro para parámetros de inyección </a:t>
+            </a:r>
+            <a:endParaRPr lang="es-CL" dirty="0"/>
+          </a:p>
+        </p:txBody>
+      </p:sp>
       <p:pic>
         <p:nvPicPr>
-          <p:cNvPr id="8" name="Picture 3"/>
+          <p:cNvPr id="3074" name="Picture 2"/>
           <p:cNvPicPr>
             <a:picLocks noChangeAspect="1" noChangeArrowheads="1"/>
           </p:cNvPicPr>
@@ -4071,15 +4223,15 @@
         </p:nvPicPr>
         <p:blipFill>
           <a:blip r:embed="rId3" cstate="print"/>
-          <a:srcRect/>
+          <a:srcRect t="3866" b="18089"/>
           <a:stretch>
             <a:fillRect/>
           </a:stretch>
         </p:blipFill>
         <p:spPr bwMode="auto">
           <a:xfrm>
-            <a:off x="1115616" y="1131590"/>
-            <a:ext cx="2088232" cy="3118786"/>
+            <a:off x="833392" y="915566"/>
+            <a:ext cx="2226440" cy="3764846"/>
           </a:xfrm>
           <a:prstGeom prst="roundRect">
             <a:avLst>
@@ -4099,46 +4251,23 @@
           </a:effectLst>
         </p:spPr>
       </p:pic>
-      <p:sp>
-        <p:nvSpPr>
-          <p:cNvPr id="9" name="8 CuadroTexto"/>
-          <p:cNvSpPr txBox="1"/>
-          <p:nvPr/>
-        </p:nvSpPr>
-        <p:spPr>
-          <a:xfrm>
-            <a:off x="4427984" y="1707654"/>
-            <a:ext cx="3960440" cy="646331"/>
-          </a:xfrm>
-          <a:prstGeom prst="rect">
-            <a:avLst/>
-          </a:prstGeom>
-          <a:noFill/>
-        </p:spPr>
-        <p:txBody>
-          <a:bodyPr wrap="square" rtlCol="0">
-            <a:spAutoFit/>
-          </a:bodyPr>
-          <a:lstStyle/>
-          <a:p>
-            <a:r>
-              <a:rPr lang="es-CL" dirty="0" smtClean="0"/>
-              <a:t>Aplicación web de registro para parámetros de inyección </a:t>
-            </a:r>
-            <a:endParaRPr lang="es-CL" dirty="0"/>
-          </a:p>
-        </p:txBody>
-      </p:sp>
     </p:spTree>
     <p:extLst>
       <p:ext uri="{BB962C8B-B14F-4D97-AF65-F5344CB8AC3E}">
-        <p14:creationId xmlns:p14="http://schemas.microsoft.com/office/powerpoint/2010/main" xmlns="" val="4170617970"/>
+        <p14:creationId xmlns="" xmlns:p14="http://schemas.microsoft.com/office/powerpoint/2010/main" val="4170617970"/>
       </p:ext>
     </p:extLst>
   </p:cSld>
   <p:clrMapOvr>
     <a:masterClrMapping/>
   </p:clrMapOvr>
+  <p:timing>
+    <p:tnLst>
+      <p:par>
+        <p:cTn id="1" dur="indefinite" restart="never" nodeType="tmRoot"/>
+      </p:par>
+    </p:tnLst>
+  </p:timing>
 </p:sld>
 </file>
 
@@ -4167,25 +4296,25 @@
         </p:nvSpPr>
         <p:spPr>
           <a:xfrm>
-            <a:off x="2880320" y="267494"/>
-            <a:ext cx="3059832" cy="1323439"/>
-          </a:xfrm>
-          <a:prstGeom prst="rect">
+            <a:off x="2915816" y="1059582"/>
+            <a:ext cx="3059832" cy="1512168"/>
+          </a:xfrm>
+          <a:prstGeom prst="roundRect">
             <a:avLst/>
           </a:prstGeom>
         </p:spPr>
         <p:style>
-          <a:lnRef idx="2">
-            <a:schemeClr val="dk1"/>
+          <a:lnRef idx="0">
+            <a:schemeClr val="accent1"/>
           </a:lnRef>
-          <a:fillRef idx="1">
-            <a:schemeClr val="lt1"/>
+          <a:fillRef idx="3">
+            <a:schemeClr val="accent1"/>
           </a:fillRef>
-          <a:effectRef idx="0">
-            <a:schemeClr val="dk1"/>
+          <a:effectRef idx="3">
+            <a:schemeClr val="accent1"/>
           </a:effectRef>
           <a:fontRef idx="minor">
-            <a:schemeClr val="dk1"/>
+            <a:schemeClr val="lt1"/>
           </a:fontRef>
         </p:style>
         <p:txBody>
@@ -4197,7 +4326,11 @@
             <a:pPr algn="just"/>
             <a:r>
               <a:rPr lang="es-CL" sz="1600" dirty="0" smtClean="0"/>
-              <a:t>1.- Ingresar </a:t>
+              <a:t>1</a:t>
+            </a:r>
+            <a:r>
+              <a:rPr lang="es-CL" sz="1600" dirty="0" smtClean="0"/>
+              <a:t>.-Ingresar </a:t>
             </a:r>
             <a:r>
               <a:rPr lang="es-CL" sz="1600" dirty="0"/>
@@ -4219,19 +4352,89 @@
             <a:pPr algn="just"/>
             <a:r>
               <a:rPr lang="es-CL" sz="1600" dirty="0" smtClean="0"/>
-              <a:t>3</a:t>
-            </a:r>
+              <a:t>3.- Ingresar</a:t>
+            </a:r>
+            <a:endParaRPr lang="es-CL" sz="1600" dirty="0"/>
+          </a:p>
+        </p:txBody>
+      </p:sp>
+      <p:sp>
+        <p:nvSpPr>
+          <p:cNvPr id="15" name="14 CuadroTexto"/>
+          <p:cNvSpPr txBox="1"/>
+          <p:nvPr/>
+        </p:nvSpPr>
+        <p:spPr>
+          <a:xfrm>
+            <a:off x="2915816" y="2715766"/>
+            <a:ext cx="3384376" cy="1800200"/>
+          </a:xfrm>
+          <a:prstGeom prst="roundRect">
+            <a:avLst/>
+          </a:prstGeom>
+        </p:spPr>
+        <p:style>
+          <a:lnRef idx="0">
+            <a:schemeClr val="accent1"/>
+          </a:lnRef>
+          <a:fillRef idx="3">
+            <a:schemeClr val="accent1"/>
+          </a:fillRef>
+          <a:effectRef idx="3">
+            <a:schemeClr val="accent1"/>
+          </a:effectRef>
+          <a:fontRef idx="minor">
+            <a:schemeClr val="lt1"/>
+          </a:fontRef>
+        </p:style>
+        <p:txBody>
+          <a:bodyPr wrap="square" rtlCol="0">
+            <a:spAutoFit/>
+          </a:bodyPr>
+          <a:lstStyle/>
+          <a:p>
+            <a:pPr algn="just"/>
             <a:r>
               <a:rPr lang="es-CL" sz="1600" dirty="0" smtClean="0"/>
-              <a:t>.- Ingresar</a:t>
-            </a:r>
-            <a:endParaRPr lang="es-CL" sz="1600" dirty="0"/>
+              <a:t>4.-Debe </a:t>
+            </a:r>
+            <a:r>
+              <a:rPr lang="es-CL" sz="1600" dirty="0"/>
+              <a:t>seleccionar un numero de OF,(se listaran las OF programadas para el día actual) o en el caso de querer cambiar de maquina solo presione el botón y vuelva a los pasos anteriores</a:t>
+            </a:r>
+          </a:p>
+        </p:txBody>
+      </p:sp>
+      <p:sp>
+        <p:nvSpPr>
+          <p:cNvPr id="7" name="1 Título"/>
+          <p:cNvSpPr>
+            <a:spLocks noGrp="1"/>
+          </p:cNvSpPr>
+          <p:nvPr>
+            <p:ph type="title"/>
+          </p:nvPr>
+        </p:nvSpPr>
+        <p:spPr>
+          <a:xfrm>
+            <a:off x="457200" y="205979"/>
+            <a:ext cx="8229600" cy="857250"/>
+          </a:xfrm>
+        </p:spPr>
+        <p:txBody>
+          <a:bodyPr/>
+          <a:lstStyle/>
+          <a:p>
+            <a:r>
+              <a:rPr lang="es-MX" dirty="0"/>
+              <a:t>Modo de Uso</a:t>
+            </a:r>
           </a:p>
         </p:txBody>
       </p:sp>
       <p:pic>
         <p:nvPicPr>
-          <p:cNvPr id="9" name="Picture 3"/>
+          <p:cNvPr id="10" name="Picture 2"/>
           <p:cNvPicPr>
             <a:picLocks noChangeAspect="1" noChangeArrowheads="1"/>
           </p:cNvPicPr>
@@ -4239,31 +4442,37 @@
         </p:nvPicPr>
         <p:blipFill>
           <a:blip r:embed="rId2" cstate="print"/>
-          <a:srcRect/>
+          <a:srcRect t="23934" b="11549"/>
           <a:stretch>
             <a:fillRect/>
           </a:stretch>
         </p:blipFill>
         <p:spPr bwMode="auto">
           <a:xfrm>
-            <a:off x="179512" y="-1"/>
-            <a:ext cx="2664296" cy="3979143"/>
-          </a:xfrm>
-          <a:prstGeom prst="rect">
-            <a:avLst/>
+            <a:off x="185465" y="987574"/>
+            <a:ext cx="2534822" cy="3543354"/>
+          </a:xfrm>
+          <a:prstGeom prst="roundRect">
+            <a:avLst>
+              <a:gd name="adj" fmla="val 6472"/>
+            </a:avLst>
           </a:prstGeom>
-          <a:noFill/>
-          <a:ln w="9525">
+          <a:solidFill>
+            <a:srgbClr val="FFFFFF">
+              <a:shade val="85000"/>
+            </a:srgbClr>
+          </a:solidFill>
+          <a:ln>
             <a:noFill/>
-            <a:miter lim="800000"/>
-            <a:headEnd/>
-            <a:tailEnd/>
           </a:ln>
+          <a:effectLst>
+            <a:reflection blurRad="12700" stA="38000" endPos="28000" dist="5000" dir="5400000" sy="-100000" algn="bl" rotWithShape="0"/>
+          </a:effectLst>
         </p:spPr>
       </p:pic>
       <p:pic>
         <p:nvPicPr>
-          <p:cNvPr id="2051" name="Picture 3"/>
+          <p:cNvPr id="1027" name="Picture 3"/>
           <p:cNvPicPr>
             <a:picLocks noChangeAspect="1" noChangeArrowheads="1"/>
           </p:cNvPicPr>
@@ -4271,121 +4480,223 @@
         </p:nvPicPr>
         <p:blipFill>
           <a:blip r:embed="rId3" cstate="print"/>
-          <a:srcRect/>
+          <a:srcRect t="9964" b="24687"/>
           <a:stretch>
             <a:fillRect/>
           </a:stretch>
         </p:blipFill>
         <p:spPr bwMode="auto">
           <a:xfrm>
-            <a:off x="6444208" y="1707654"/>
-            <a:ext cx="2724150" cy="390525"/>
-          </a:xfrm>
-          <a:prstGeom prst="rect">
+            <a:off x="6444208" y="1059582"/>
+            <a:ext cx="2426644" cy="3435846"/>
+          </a:xfrm>
+          <a:prstGeom prst="roundRect">
+            <a:avLst>
+              <a:gd name="adj" fmla="val 8594"/>
+            </a:avLst>
+          </a:prstGeom>
+          <a:solidFill>
+            <a:srgbClr val="FFFFFF">
+              <a:shade val="85000"/>
+            </a:srgbClr>
+          </a:solidFill>
+          <a:ln>
+            <a:noFill/>
+          </a:ln>
+          <a:effectLst>
+            <a:reflection blurRad="12700" stA="38000" endPos="28000" dist="5000" dir="5400000" sy="-100000" algn="bl" rotWithShape="0"/>
+          </a:effectLst>
+        </p:spPr>
+      </p:pic>
+      <p:sp>
+        <p:nvSpPr>
+          <p:cNvPr id="13" name="12 CuadroTexto"/>
+          <p:cNvSpPr txBox="1"/>
+          <p:nvPr/>
+        </p:nvSpPr>
+        <p:spPr>
+          <a:xfrm>
+            <a:off x="1619672" y="3147814"/>
+            <a:ext cx="406194" cy="367873"/>
+          </a:xfrm>
+          <a:prstGeom prst="ellipse">
             <a:avLst/>
           </a:prstGeom>
-          <a:noFill/>
-          <a:ln w="9525">
-            <a:noFill/>
-            <a:miter lim="800000"/>
-            <a:headEnd/>
-            <a:tailEnd/>
-          </a:ln>
-        </p:spPr>
-      </p:pic>
-      <p:sp>
-        <p:nvSpPr>
-          <p:cNvPr id="15" name="14 CuadroTexto"/>
+        </p:spPr>
+        <p:style>
+          <a:lnRef idx="0">
+            <a:schemeClr val="accent3"/>
+          </a:lnRef>
+          <a:fillRef idx="3">
+            <a:schemeClr val="accent3"/>
+          </a:fillRef>
+          <a:effectRef idx="3">
+            <a:schemeClr val="accent3"/>
+          </a:effectRef>
+          <a:fontRef idx="minor">
+            <a:schemeClr val="lt1"/>
+          </a:fontRef>
+        </p:style>
+        <p:txBody>
+          <a:bodyPr wrap="none" rtlCol="0">
+            <a:spAutoFit/>
+          </a:bodyPr>
+          <a:lstStyle/>
+          <a:p>
+            <a:r>
+              <a:rPr lang="es-CL" sz="1100" b="1" dirty="0" smtClean="0"/>
+              <a:t> 2</a:t>
+            </a:r>
+            <a:endParaRPr lang="es-CL" sz="1100" b="1" dirty="0"/>
+          </a:p>
+        </p:txBody>
+      </p:sp>
+      <p:sp>
+        <p:nvSpPr>
+          <p:cNvPr id="14" name="13 CuadroTexto"/>
           <p:cNvSpPr txBox="1"/>
           <p:nvPr/>
         </p:nvSpPr>
         <p:spPr>
           <a:xfrm>
-            <a:off x="2987824" y="2067694"/>
-            <a:ext cx="3384376" cy="1569660"/>
-          </a:xfrm>
-          <a:prstGeom prst="rect">
+            <a:off x="683568" y="3507854"/>
+            <a:ext cx="406194" cy="367873"/>
+          </a:xfrm>
+          <a:prstGeom prst="ellipse">
             <a:avLst/>
           </a:prstGeom>
         </p:spPr>
         <p:style>
-          <a:lnRef idx="2">
-            <a:schemeClr val="dk1"/>
+          <a:lnRef idx="0">
+            <a:schemeClr val="accent3"/>
           </a:lnRef>
-          <a:fillRef idx="1">
-            <a:schemeClr val="lt1"/>
+          <a:fillRef idx="3">
+            <a:schemeClr val="accent3"/>
           </a:fillRef>
-          <a:effectRef idx="0">
-            <a:schemeClr val="dk1"/>
+          <a:effectRef idx="3">
+            <a:schemeClr val="accent3"/>
           </a:effectRef>
           <a:fontRef idx="minor">
-            <a:schemeClr val="dk1"/>
+            <a:schemeClr val="lt1"/>
           </a:fontRef>
         </p:style>
         <p:txBody>
-          <a:bodyPr wrap="square" rtlCol="0">
+          <a:bodyPr wrap="none" rtlCol="0">
             <a:spAutoFit/>
           </a:bodyPr>
           <a:lstStyle/>
           <a:p>
-            <a:pPr algn="just"/>
-            <a:r>
-              <a:rPr lang="es-CL" sz="1600" dirty="0" smtClean="0"/>
-              <a:t>4</a:t>
-            </a:r>
-            <a:r>
-              <a:rPr lang="es-CL" sz="1600" dirty="0" smtClean="0"/>
-              <a:t>.-Debe </a:t>
-            </a:r>
-            <a:r>
-              <a:rPr lang="es-CL" sz="1600" dirty="0"/>
-              <a:t>seleccionar un numero de OF,(se listaran las OF programadas para el día actual) o en el caso de querer cambiar de maquina solo presione el botón y vuelva a los pasos anteriores</a:t>
-            </a:r>
-          </a:p>
-        </p:txBody>
-      </p:sp>
-      <p:pic>
-        <p:nvPicPr>
-          <p:cNvPr id="1026" name="Picture 2"/>
-          <p:cNvPicPr>
-            <a:picLocks noChangeAspect="1" noChangeArrowheads="1"/>
-          </p:cNvPicPr>
+            <a:r>
+              <a:rPr lang="es-CL" sz="1100" b="1" dirty="0" smtClean="0"/>
+              <a:t> 3</a:t>
+            </a:r>
+            <a:endParaRPr lang="es-CL" sz="1100" b="1" dirty="0"/>
+          </a:p>
+        </p:txBody>
+      </p:sp>
+      <p:sp>
+        <p:nvSpPr>
+          <p:cNvPr id="16" name="15 CuadroTexto"/>
+          <p:cNvSpPr txBox="1"/>
           <p:nvPr/>
-        </p:nvPicPr>
-        <p:blipFill>
-          <a:blip r:embed="rId4" cstate="print"/>
-          <a:srcRect/>
-          <a:stretch>
-            <a:fillRect/>
-          </a:stretch>
-        </p:blipFill>
-        <p:spPr bwMode="auto">
-          <a:xfrm>
-            <a:off x="6419850" y="2095500"/>
-            <a:ext cx="2724150" cy="3048000"/>
-          </a:xfrm>
-          <a:prstGeom prst="rect">
+        </p:nvSpPr>
+        <p:spPr>
+          <a:xfrm>
+            <a:off x="1043608" y="2643758"/>
+            <a:ext cx="406194" cy="367873"/>
+          </a:xfrm>
+          <a:prstGeom prst="ellipse">
             <a:avLst/>
           </a:prstGeom>
-          <a:noFill/>
-          <a:ln w="9525">
-            <a:noFill/>
-            <a:miter lim="800000"/>
-            <a:headEnd/>
-            <a:tailEnd/>
-          </a:ln>
-        </p:spPr>
-      </p:pic>
+        </p:spPr>
+        <p:style>
+          <a:lnRef idx="0">
+            <a:schemeClr val="accent3"/>
+          </a:lnRef>
+          <a:fillRef idx="3">
+            <a:schemeClr val="accent3"/>
+          </a:fillRef>
+          <a:effectRef idx="3">
+            <a:schemeClr val="accent3"/>
+          </a:effectRef>
+          <a:fontRef idx="minor">
+            <a:schemeClr val="lt1"/>
+          </a:fontRef>
+        </p:style>
+        <p:txBody>
+          <a:bodyPr wrap="none" rtlCol="0">
+            <a:spAutoFit/>
+          </a:bodyPr>
+          <a:lstStyle/>
+          <a:p>
+            <a:r>
+              <a:rPr lang="es-CL" sz="1100" b="1" dirty="0" smtClean="0"/>
+              <a:t> 1</a:t>
+            </a:r>
+            <a:endParaRPr lang="es-CL" sz="1100" b="1" dirty="0"/>
+          </a:p>
+        </p:txBody>
+      </p:sp>
+      <p:sp>
+        <p:nvSpPr>
+          <p:cNvPr id="17" name="16 CuadroTexto"/>
+          <p:cNvSpPr txBox="1"/>
+          <p:nvPr/>
+        </p:nvSpPr>
+        <p:spPr>
+          <a:xfrm>
+            <a:off x="7164288" y="3363838"/>
+            <a:ext cx="406194" cy="367873"/>
+          </a:xfrm>
+          <a:prstGeom prst="ellipse">
+            <a:avLst/>
+          </a:prstGeom>
+        </p:spPr>
+        <p:style>
+          <a:lnRef idx="0">
+            <a:schemeClr val="accent3"/>
+          </a:lnRef>
+          <a:fillRef idx="3">
+            <a:schemeClr val="accent3"/>
+          </a:fillRef>
+          <a:effectRef idx="3">
+            <a:schemeClr val="accent3"/>
+          </a:effectRef>
+          <a:fontRef idx="minor">
+            <a:schemeClr val="lt1"/>
+          </a:fontRef>
+        </p:style>
+        <p:txBody>
+          <a:bodyPr wrap="none" rtlCol="0">
+            <a:spAutoFit/>
+          </a:bodyPr>
+          <a:lstStyle/>
+          <a:p>
+            <a:r>
+              <a:rPr lang="es-CL" sz="1100" b="1" dirty="0" smtClean="0"/>
+              <a:t> 4</a:t>
+            </a:r>
+            <a:endParaRPr lang="es-CL" sz="1100" b="1" dirty="0"/>
+          </a:p>
+        </p:txBody>
+      </p:sp>
     </p:spTree>
     <p:extLst>
       <p:ext uri="{BB962C8B-B14F-4D97-AF65-F5344CB8AC3E}">
-        <p14:creationId xmlns:p14="http://schemas.microsoft.com/office/powerpoint/2010/main" xmlns="" val="448307809"/>
+        <p14:creationId xmlns="" xmlns:p14="http://schemas.microsoft.com/office/powerpoint/2010/main" val="448307809"/>
       </p:ext>
     </p:extLst>
   </p:cSld>
   <p:clrMapOvr>
     <a:masterClrMapping/>
   </p:clrMapOvr>
+  <p:timing>
+    <p:tnLst>
+      <p:par>
+        <p:cTn id="1" dur="indefinite" restart="never" nodeType="tmRoot"/>
+      </p:par>
+    </p:tnLst>
+  </p:timing>
 </p:sld>
 </file>
 
@@ -4424,7 +4735,7 @@
             <a:fld id="{D509CB46-7F35-4ED8-B4EB-7D2059EFAEEF}" type="datetime10">
               <a:rPr lang="es-CL" smtClean="0"/>
               <a:pPr/>
-              <a:t>10:23</a:t>
+              <a:t>15:23</a:t>
             </a:fld>
             <a:endParaRPr lang="es-CL" dirty="0"/>
           </a:p>
@@ -4440,26 +4751,32 @@
         </p:nvPicPr>
         <p:blipFill>
           <a:blip r:embed="rId2" cstate="print"/>
-          <a:srcRect/>
+          <a:srcRect t="24800"/>
           <a:stretch>
             <a:fillRect/>
           </a:stretch>
         </p:blipFill>
         <p:spPr bwMode="auto">
           <a:xfrm>
-            <a:off x="0" y="0"/>
-            <a:ext cx="4703200" cy="5143500"/>
-          </a:xfrm>
-          <a:prstGeom prst="rect">
-            <a:avLst/>
+            <a:off x="539552" y="1059582"/>
+            <a:ext cx="3960440" cy="3257051"/>
+          </a:xfrm>
+          <a:prstGeom prst="roundRect">
+            <a:avLst>
+              <a:gd name="adj" fmla="val 5100"/>
+            </a:avLst>
           </a:prstGeom>
-          <a:noFill/>
-          <a:ln w="9525">
+          <a:solidFill>
+            <a:srgbClr val="FFFFFF">
+              <a:shade val="85000"/>
+            </a:srgbClr>
+          </a:solidFill>
+          <a:ln>
             <a:noFill/>
-            <a:miter lim="800000"/>
-            <a:headEnd/>
-            <a:tailEnd/>
           </a:ln>
+          <a:effectLst>
+            <a:reflection blurRad="12700" stA="38000" endPos="28000" dist="5000" dir="5400000" sy="-100000" algn="bl" rotWithShape="0"/>
+          </a:effectLst>
         </p:spPr>
       </p:pic>
       <p:sp>
@@ -4470,25 +4787,25 @@
         </p:nvSpPr>
         <p:spPr>
           <a:xfrm>
-            <a:off x="5004048" y="843558"/>
-            <a:ext cx="3960440" cy="1077218"/>
-          </a:xfrm>
-          <a:prstGeom prst="rect">
+            <a:off x="4788024" y="1107519"/>
+            <a:ext cx="3960440" cy="1464231"/>
+          </a:xfrm>
+          <a:prstGeom prst="roundRect">
             <a:avLst/>
           </a:prstGeom>
         </p:spPr>
         <p:style>
-          <a:lnRef idx="2">
-            <a:schemeClr val="dk1"/>
+          <a:lnRef idx="0">
+            <a:schemeClr val="accent1"/>
           </a:lnRef>
-          <a:fillRef idx="1">
-            <a:schemeClr val="lt1"/>
+          <a:fillRef idx="3">
+            <a:schemeClr val="accent1"/>
           </a:fillRef>
-          <a:effectRef idx="0">
-            <a:schemeClr val="dk1"/>
+          <a:effectRef idx="3">
+            <a:schemeClr val="accent1"/>
           </a:effectRef>
           <a:fontRef idx="minor">
-            <a:schemeClr val="dk1"/>
+            <a:schemeClr val="lt1"/>
           </a:fontRef>
         </p:style>
         <p:txBody>
@@ -4500,14 +4817,15 @@
             <a:pPr algn="just"/>
             <a:r>
               <a:rPr lang="es-CL" sz="1600" dirty="0"/>
-              <a:t>En esta siguiente pantalla se deben completar </a:t>
-            </a:r>
-          </a:p>
-          <a:p>
-            <a:pPr algn="just"/>
+              <a:t>En esta siguiente pantalla se deben </a:t>
+            </a:r>
+            <a:r>
+              <a:rPr lang="es-CL" sz="1600" dirty="0" smtClean="0"/>
+              <a:t>completar los </a:t>
+            </a:r>
             <a:r>
               <a:rPr lang="es-CL" sz="1600" dirty="0"/>
-              <a:t>Los cuadros que estén en blanco y una vez que se completen los campos se deben guardar los datos de la inyección con el botón </a:t>
+              <a:t>cuadros que estén en blanco y una vez que se completen los campos se deben guardar los datos de la inyección con el botón </a:t>
             </a:r>
           </a:p>
         </p:txBody>
@@ -4520,25 +4838,25 @@
         </p:nvSpPr>
         <p:spPr>
           <a:xfrm>
-            <a:off x="5004048" y="3003798"/>
-            <a:ext cx="3888432" cy="1323439"/>
-          </a:xfrm>
-          <a:prstGeom prst="rect">
+            <a:off x="4788024" y="2859782"/>
+            <a:ext cx="3960440" cy="1464231"/>
+          </a:xfrm>
+          <a:prstGeom prst="roundRect">
             <a:avLst/>
           </a:prstGeom>
         </p:spPr>
         <p:style>
-          <a:lnRef idx="2">
-            <a:schemeClr val="dk1"/>
+          <a:lnRef idx="0">
+            <a:schemeClr val="accent1"/>
           </a:lnRef>
-          <a:fillRef idx="1">
-            <a:schemeClr val="lt1"/>
+          <a:fillRef idx="3">
+            <a:schemeClr val="accent1"/>
           </a:fillRef>
-          <a:effectRef idx="0">
-            <a:schemeClr val="dk1"/>
+          <a:effectRef idx="3">
+            <a:schemeClr val="accent1"/>
           </a:effectRef>
           <a:fontRef idx="minor">
-            <a:schemeClr val="dk1"/>
+            <a:schemeClr val="lt1"/>
           </a:fontRef>
         </p:style>
         <p:txBody>
@@ -4551,6 +4869,33 @@
             <a:r>
               <a:rPr lang="es-CL" sz="1600" dirty="0"/>
               <a:t>Si el porcentaje de inyección ingresado es inferior al porcentaje optimo de inyección proporcionado por la tabla de marinado se enviara una alerta vía telegram (bot automático)</a:t>
+            </a:r>
+          </a:p>
+        </p:txBody>
+      </p:sp>
+      <p:sp>
+        <p:nvSpPr>
+          <p:cNvPr id="8" name="1 Título"/>
+          <p:cNvSpPr>
+            <a:spLocks noGrp="1"/>
+          </p:cNvSpPr>
+          <p:nvPr>
+            <p:ph type="title"/>
+          </p:nvPr>
+        </p:nvSpPr>
+        <p:spPr>
+          <a:xfrm>
+            <a:off x="457200" y="205979"/>
+            <a:ext cx="8229600" cy="857250"/>
+          </a:xfrm>
+        </p:spPr>
+        <p:txBody>
+          <a:bodyPr/>
+          <a:lstStyle/>
+          <a:p>
+            <a:r>
+              <a:rPr lang="es-MX" dirty="0"/>
+              <a:t>Modo de Uso</a:t>
             </a:r>
           </a:p>
         </p:txBody>
@@ -4560,6 +4905,13 @@
   <p:clrMapOvr>
     <a:masterClrMapping/>
   </p:clrMapOvr>
+  <p:timing>
+    <p:tnLst>
+      <p:par>
+        <p:cTn id="1" dur="indefinite" restart="never" nodeType="tmRoot"/>
+      </p:par>
+    </p:tnLst>
+  </p:timing>
 </p:sld>
 </file>
 
@@ -4601,32 +4953,21 @@
           <a:lstStyle/>
           <a:p>
             <a:r>
-              <a:rPr lang="es-CL" dirty="0"/>
-              <a:t>BOT TELEGRAM MESSENGER</a:t>
-            </a:r>
-          </a:p>
-        </p:txBody>
-      </p:sp>
-      <p:sp>
-        <p:nvSpPr>
-          <p:cNvPr id="4" name="3 Marcador de fecha"/>
-          <p:cNvSpPr>
-            <a:spLocks noGrp="1"/>
-          </p:cNvSpPr>
-          <p:nvPr>
-            <p:ph type="dt" sz="half" idx="10"/>
-          </p:nvPr>
-        </p:nvSpPr>
-        <p:spPr/>
-        <p:txBody>
-          <a:bodyPr/>
-          <a:lstStyle/>
-          <a:p>
-            <a:fld id="{D509CB46-7F35-4ED8-B4EB-7D2059EFAEEF}" type="datetime10">
-              <a:rPr lang="es-CL" smtClean="0"/>
-              <a:pPr/>
-              <a:t>10:23</a:t>
-            </a:fld>
+              <a:rPr lang="es-CL" dirty="0" smtClean="0"/>
+              <a:t>Bot</a:t>
+            </a:r>
+            <a:r>
+              <a:rPr lang="es-CL" dirty="0" smtClean="0"/>
+              <a:t> </a:t>
+            </a:r>
+            <a:r>
+              <a:rPr lang="es-CL" dirty="0" smtClean="0"/>
+              <a:t>Telegram</a:t>
+            </a:r>
+            <a:r>
+              <a:rPr lang="es-CL" dirty="0" smtClean="0"/>
+              <a:t> Messenger</a:t>
+            </a:r>
             <a:endParaRPr lang="es-CL" dirty="0"/>
           </a:p>
         </p:txBody>
@@ -4722,11 +5063,7 @@
             <a:pPr lvl="1"/>
             <a:r>
               <a:rPr lang="es-CL" dirty="0"/>
-              <a:t>Descarga para </a:t>
-            </a:r>
-            <a:r>
-              <a:rPr lang="es-CL" dirty="0"/>
-              <a:t>A</a:t>
+              <a:t>Descarga para A</a:t>
             </a:r>
             <a:r>
               <a:rPr lang="es-CL" dirty="0" smtClean="0"/>
@@ -4734,11 +5071,7 @@
             </a:r>
             <a:r>
               <a:rPr lang="es-CL" dirty="0"/>
-              <a:t>o </a:t>
-            </a:r>
-            <a:r>
-              <a:rPr lang="es-CL" dirty="0"/>
-              <a:t>I</a:t>
+              <a:t>o I</a:t>
             </a:r>
             <a:r>
               <a:rPr lang="es-CL" dirty="0" smtClean="0"/>
@@ -4774,16 +5107,22 @@
             <a:off x="1763688" y="1923678"/>
             <a:ext cx="2232248" cy="727474"/>
           </a:xfrm>
-          <a:prstGeom prst="rect">
-            <a:avLst/>
+          <a:prstGeom prst="roundRect">
+            <a:avLst>
+              <a:gd name="adj" fmla="val 8594"/>
+            </a:avLst>
           </a:prstGeom>
-          <a:noFill/>
-          <a:ln w="9525">
+          <a:solidFill>
+            <a:srgbClr val="FFFFFF">
+              <a:shade val="85000"/>
+            </a:srgbClr>
+          </a:solidFill>
+          <a:ln>
             <a:noFill/>
-            <a:miter lim="800000"/>
-            <a:headEnd/>
-            <a:tailEnd/>
           </a:ln>
+          <a:effectLst>
+            <a:reflection blurRad="12700" stA="38000" endPos="28000" dist="5000" dir="5400000" sy="-100000" algn="bl" rotWithShape="0"/>
+          </a:effectLst>
         </p:spPr>
       </p:pic>
       <p:pic>
@@ -4808,16 +5147,22 @@
             <a:off x="4860032" y="1923678"/>
             <a:ext cx="2232248" cy="730825"/>
           </a:xfrm>
-          <a:prstGeom prst="rect">
-            <a:avLst/>
+          <a:prstGeom prst="roundRect">
+            <a:avLst>
+              <a:gd name="adj" fmla="val 8594"/>
+            </a:avLst>
           </a:prstGeom>
-          <a:noFill/>
-          <a:ln w="9525">
+          <a:solidFill>
+            <a:srgbClr val="FFFFFF">
+              <a:shade val="85000"/>
+            </a:srgbClr>
+          </a:solidFill>
+          <a:ln>
             <a:noFill/>
-            <a:miter lim="800000"/>
-            <a:headEnd/>
-            <a:tailEnd/>
           </a:ln>
+          <a:effectLst>
+            <a:reflection blurRad="12700" stA="38000" endPos="28000" dist="5000" dir="5400000" sy="-100000" algn="bl" rotWithShape="0"/>
+          </a:effectLst>
         </p:spPr>
       </p:pic>
       <p:sp>
@@ -4930,24 +5275,7 @@
                 <a:ea typeface="+mn-ea"/>
                 <a:cs typeface="+mn-cs"/>
               </a:rPr>
-              <a:t>elegram</a:t>
-            </a:r>
-            <a:r>
-              <a:rPr kumimoji="0" lang="es-CL" sz="2000" i="0" u="none" strike="noStrike" kern="1200" cap="none" spc="0" normalizeH="0" noProof="0" dirty="0" smtClean="0">
-                <a:ln>
-                  <a:noFill/>
-                </a:ln>
-                <a:solidFill>
-                  <a:schemeClr val="tx1"/>
-                </a:solidFill>
-                <a:effectLst/>
-                <a:uLnTx/>
-                <a:uFillTx/>
-                <a:latin typeface="+mn-lt"/>
-                <a:ea typeface="+mn-ea"/>
-                <a:cs typeface="+mn-cs"/>
-              </a:rPr>
-              <a:t> Messenger</a:t>
+              <a:t>elegram Messenger</a:t>
             </a:r>
             <a:endParaRPr kumimoji="0" lang="es-CL" sz="2000" i="0" u="none" strike="noStrike" kern="1200" cap="none" spc="0" normalizeH="0" noProof="0" dirty="0">
               <a:ln>
@@ -5070,6 +5398,13 @@
   <p:clrMapOvr>
     <a:masterClrMapping/>
   </p:clrMapOvr>
+  <p:timing>
+    <p:tnLst>
+      <p:par>
+        <p:cTn id="1" dur="indefinite" restart="never" nodeType="tmRoot"/>
+      </p:par>
+    </p:tnLst>
+  </p:timing>
 </p:sld>
 </file>
 
@@ -5092,75 +5427,10 @@
       </p:grpSpPr>
       <p:pic>
         <p:nvPicPr>
-          <p:cNvPr id="16" name="Imagen 15" descr="Interfaz de usuario gráfica, Texto, Aplicación&#10;&#10;Descripción generada automáticamente">
-            <a:extLst>
-              <a:ext uri="{FF2B5EF4-FFF2-40B4-BE49-F238E27FC236}">
-                <a16:creationId xmlns:a16="http://schemas.microsoft.com/office/drawing/2014/main" xmlns="" id="{0D55C498-C1F2-4E9E-967F-F1A84EEA8559}"/>
-              </a:ext>
-            </a:extLst>
-          </p:cNvPr>
-          <p:cNvPicPr>
-            <a:picLocks noChangeAspect="1"/>
-          </p:cNvPicPr>
-          <p:nvPr/>
-        </p:nvPicPr>
-        <p:blipFill rotWithShape="1">
-          <a:blip r:embed="rId2" cstate="print">
-            <a:extLst>
-              <a:ext uri="{28A0092B-C50C-407E-A947-70E740481C1C}">
-                <a14:useLocalDpi xmlns:a14="http://schemas.microsoft.com/office/drawing/2010/main" xmlns="" val="0"/>
-              </a:ext>
-            </a:extLst>
-          </a:blip>
-          <a:srcRect t="65400" b="12200"/>
-          <a:stretch/>
-        </p:blipFill>
-        <p:spPr>
-          <a:xfrm>
-            <a:off x="6228184" y="3651870"/>
-            <a:ext cx="2849089" cy="1382739"/>
-          </a:xfrm>
-          <a:prstGeom prst="rect">
-            <a:avLst/>
-          </a:prstGeom>
-        </p:spPr>
-      </p:pic>
-      <p:sp>
-        <p:nvSpPr>
-          <p:cNvPr id="4" name="Marcador de fecha 3">
-            <a:extLst>
-              <a:ext uri="{FF2B5EF4-FFF2-40B4-BE49-F238E27FC236}">
-                <a16:creationId xmlns:a16="http://schemas.microsoft.com/office/drawing/2014/main" xmlns="" id="{60229049-123F-4078-BB1C-C3405239ED2F}"/>
-              </a:ext>
-            </a:extLst>
-          </p:cNvPr>
-          <p:cNvSpPr>
-            <a:spLocks noGrp="1"/>
-          </p:cNvSpPr>
-          <p:nvPr>
-            <p:ph type="dt" sz="half" idx="10"/>
-          </p:nvPr>
-        </p:nvSpPr>
-        <p:spPr/>
-        <p:txBody>
-          <a:bodyPr/>
-          <a:lstStyle/>
-          <a:p>
-            <a:fld id="{D509CB46-7F35-4ED8-B4EB-7D2059EFAEEF}" type="datetime10">
-              <a:rPr lang="es-CL" smtClean="0"/>
-              <a:pPr/>
-              <a:t>10:23</a:t>
-            </a:fld>
-            <a:endParaRPr lang="es-CL" dirty="0"/>
-          </a:p>
-        </p:txBody>
-      </p:sp>
-      <p:pic>
-        <p:nvPicPr>
           <p:cNvPr id="5" name="Picture 2" descr="C:\Users\murrutiam\Pictures\bot\1626125963268.jpg">
             <a:extLst>
               <a:ext uri="{FF2B5EF4-FFF2-40B4-BE49-F238E27FC236}">
-                <a16:creationId xmlns:a16="http://schemas.microsoft.com/office/drawing/2014/main" xmlns="" id="{D9D5AF12-56E9-4450-B3F5-E4437F95A06D}"/>
+                <a16:creationId xmlns="" xmlns:a16="http://schemas.microsoft.com/office/drawing/2014/main" id="{D9D5AF12-56E9-4450-B3F5-E4437F95A06D}"/>
               </a:ext>
             </a:extLst>
           </p:cNvPr>
@@ -5170,63 +5440,63 @@
           <p:nvPr/>
         </p:nvPicPr>
         <p:blipFill rotWithShape="1">
-          <a:blip r:embed="rId3" cstate="print"/>
+          <a:blip r:embed="rId2" cstate="print"/>
           <a:srcRect t="1" b="65592"/>
           <a:stretch/>
         </p:blipFill>
         <p:spPr bwMode="auto">
           <a:xfrm>
-            <a:off x="100666" y="121283"/>
+            <a:off x="179512" y="1419622"/>
             <a:ext cx="2383102" cy="1807295"/>
           </a:xfrm>
-          <a:prstGeom prst="rect">
-            <a:avLst/>
+          <a:prstGeom prst="roundRect">
+            <a:avLst>
+              <a:gd name="adj" fmla="val 8594"/>
+            </a:avLst>
           </a:prstGeom>
-          <a:noFill/>
+          <a:solidFill>
+            <a:srgbClr val="FFFFFF">
+              <a:shade val="85000"/>
+            </a:srgbClr>
+          </a:solidFill>
+          <a:ln>
+            <a:noFill/>
+          </a:ln>
+          <a:effectLst>
+            <a:reflection blurRad="12700" stA="38000" endPos="28000" dist="5000" dir="5400000" sy="-100000" algn="bl" rotWithShape="0"/>
+          </a:effectLst>
         </p:spPr>
       </p:pic>
       <p:sp>
         <p:nvSpPr>
-          <p:cNvPr id="6" name="Flecha: a la derecha 5">
+          <p:cNvPr id="7" name="CuadroTexto 6">
             <a:extLst>
               <a:ext uri="{FF2B5EF4-FFF2-40B4-BE49-F238E27FC236}">
-                <a16:creationId xmlns:a16="http://schemas.microsoft.com/office/drawing/2014/main" xmlns="" id="{6BF1DBAF-8EA7-494B-98B9-42E2DFFF8A46}"/>
+                <a16:creationId xmlns="" xmlns:a16="http://schemas.microsoft.com/office/drawing/2014/main" id="{C61E4412-DD05-434E-AF1F-4307A29D33F1}"/>
               </a:ext>
             </a:extLst>
           </p:cNvPr>
-          <p:cNvSpPr/>
+          <p:cNvSpPr txBox="1"/>
           <p:nvPr/>
         </p:nvSpPr>
         <p:spPr>
-          <a:xfrm rot="10519541">
-            <a:off x="1047566" y="320508"/>
-            <a:ext cx="1734117" cy="167904"/>
-          </a:xfrm>
-          <a:prstGeom prst="rightArrow">
-            <a:avLst>
-              <a:gd name="adj1" fmla="val 29955"/>
-              <a:gd name="adj2" fmla="val 50000"/>
-            </a:avLst>
+          <a:xfrm>
+            <a:off x="2699792" y="1419622"/>
+            <a:ext cx="3240360" cy="1191816"/>
+          </a:xfrm>
+          <a:prstGeom prst="roundRect">
+            <a:avLst/>
           </a:prstGeom>
-          <a:solidFill>
+          <a:ln/>
+        </p:spPr>
+        <p:style>
+          <a:lnRef idx="0">
             <a:schemeClr val="accent1"/>
-          </a:solidFill>
-          <a:ln>
-            <a:solidFill>
-              <a:schemeClr val="accent1"/>
-            </a:solidFill>
-          </a:ln>
-        </p:spPr>
-        <p:style>
-          <a:lnRef idx="2">
-            <a:schemeClr val="accent1">
-              <a:shade val="50000"/>
-            </a:schemeClr>
           </a:lnRef>
-          <a:fillRef idx="1">
+          <a:fillRef idx="3">
             <a:schemeClr val="accent1"/>
           </a:fillRef>
-          <a:effectRef idx="0">
+          <a:effectRef idx="3">
             <a:schemeClr val="accent1"/>
           </a:effectRef>
           <a:fontRef idx="minor">
@@ -5234,69 +5504,81 @@
           </a:fontRef>
         </p:style>
         <p:txBody>
-          <a:bodyPr rtlCol="0" anchor="ctr"/>
-          <a:lstStyle/>
-          <a:p>
-            <a:pPr algn="ctr"/>
-            <a:endParaRPr lang="es-CL" b="1" dirty="0">
-              <a:ln w="22225">
+          <a:bodyPr wrap="square" rtlCol="0">
+            <a:spAutoFit/>
+          </a:bodyPr>
+          <a:lstStyle/>
+          <a:p>
+            <a:r>
+              <a:rPr lang="es-MX" sz="1600" dirty="0"/>
+              <a:t>1.- En el cuadro de búsqueda, buscar el BOT </a:t>
+            </a:r>
+            <a:r>
+              <a:rPr lang="es-MX" sz="1600" dirty="0" smtClean="0"/>
+              <a:t>“</a:t>
+            </a:r>
+            <a:r>
+              <a:rPr lang="es-MX" sz="1600" b="1" dirty="0" smtClean="0">
                 <a:solidFill>
-                  <a:schemeClr val="accent2"/>
+                  <a:schemeClr val="tx1"/>
                 </a:solidFill>
-                <a:prstDash val="solid"/>
-              </a:ln>
-              <a:solidFill>
-                <a:schemeClr val="accent2">
-                  <a:lumMod val="40000"/>
-                  <a:lumOff val="60000"/>
-                </a:schemeClr>
-              </a:solidFill>
-            </a:endParaRPr>
-          </a:p>
-        </p:txBody>
-      </p:sp>
-      <p:sp>
-        <p:nvSpPr>
-          <p:cNvPr id="8" name="Flecha: a la derecha 7">
+              </a:rPr>
+              <a:t>pamco</a:t>
+            </a:r>
+            <a:r>
+              <a:rPr lang="es-MX" sz="1600" b="1" dirty="0" smtClean="0">
+                <a:solidFill>
+                  <a:schemeClr val="bg1"/>
+                </a:solidFill>
+              </a:rPr>
+              <a:t>”</a:t>
+            </a:r>
+            <a:r>
+              <a:rPr lang="es-MX" sz="1600" dirty="0" smtClean="0"/>
+              <a:t> </a:t>
+            </a:r>
+            <a:r>
+              <a:rPr lang="es-MX" sz="1600" dirty="0"/>
+              <a:t>y seleccionar el que tiene el logo de </a:t>
+            </a:r>
+            <a:r>
+              <a:rPr lang="es-MX" sz="1600" u="sng" dirty="0"/>
+              <a:t>Ariztia</a:t>
+            </a:r>
+            <a:endParaRPr lang="es-CL" sz="1600" u="sng" dirty="0"/>
+          </a:p>
+        </p:txBody>
+      </p:sp>
+      <p:sp>
+        <p:nvSpPr>
+          <p:cNvPr id="14" name="CuadroTexto 13">
             <a:extLst>
               <a:ext uri="{FF2B5EF4-FFF2-40B4-BE49-F238E27FC236}">
-                <a16:creationId xmlns:a16="http://schemas.microsoft.com/office/drawing/2014/main" xmlns="" id="{53FD90BA-45D5-4B5C-944A-755E34DEC240}"/>
+                <a16:creationId xmlns="" xmlns:a16="http://schemas.microsoft.com/office/drawing/2014/main" id="{A1B5D83D-6A24-4BE8-B0C4-256D5D96628B}"/>
               </a:ext>
             </a:extLst>
           </p:cNvPr>
-          <p:cNvSpPr/>
+          <p:cNvSpPr txBox="1"/>
           <p:nvPr/>
         </p:nvSpPr>
         <p:spPr>
-          <a:xfrm rot="10368256">
-            <a:off x="975047" y="588312"/>
-            <a:ext cx="1797064" cy="198164"/>
-          </a:xfrm>
-          <a:prstGeom prst="rightArrow">
-            <a:avLst>
-              <a:gd name="adj1" fmla="val 29955"/>
-              <a:gd name="adj2" fmla="val 50000"/>
-            </a:avLst>
+          <a:xfrm>
+            <a:off x="3203848" y="3795886"/>
+            <a:ext cx="2522397" cy="681038"/>
+          </a:xfrm>
+          <a:prstGeom prst="roundRect">
+            <a:avLst/>
           </a:prstGeom>
-          <a:solidFill>
+          <a:ln/>
+        </p:spPr>
+        <p:style>
+          <a:lnRef idx="0">
             <a:schemeClr val="accent1"/>
-          </a:solidFill>
-          <a:ln>
-            <a:solidFill>
-              <a:schemeClr val="accent1"/>
-            </a:solidFill>
-          </a:ln>
-        </p:spPr>
-        <p:style>
-          <a:lnRef idx="2">
-            <a:schemeClr val="accent1">
-              <a:shade val="50000"/>
-            </a:schemeClr>
           </a:lnRef>
-          <a:fillRef idx="1">
+          <a:fillRef idx="3">
             <a:schemeClr val="accent1"/>
           </a:fillRef>
-          <a:effectRef idx="0">
+          <a:effectRef idx="3">
             <a:schemeClr val="accent1"/>
           </a:effectRef>
           <a:fontRef idx="minor">
@@ -5304,662 +5586,6 @@
           </a:fontRef>
         </p:style>
         <p:txBody>
-          <a:bodyPr rtlCol="0" anchor="ctr"/>
-          <a:lstStyle/>
-          <a:p>
-            <a:pPr algn="ctr"/>
-            <a:endParaRPr lang="es-CL" b="1" dirty="0">
-              <a:ln w="22225">
-                <a:solidFill>
-                  <a:schemeClr val="accent2"/>
-                </a:solidFill>
-                <a:prstDash val="solid"/>
-              </a:ln>
-              <a:solidFill>
-                <a:schemeClr val="accent2">
-                  <a:lumMod val="40000"/>
-                  <a:lumOff val="60000"/>
-                </a:schemeClr>
-              </a:solidFill>
-            </a:endParaRPr>
-          </a:p>
-        </p:txBody>
-      </p:sp>
-      <p:pic>
-        <p:nvPicPr>
-          <p:cNvPr id="9" name="Picture 3" descr="C:\Users\murrutiam\Pictures\bot\1626125963261.jpg">
-            <a:extLst>
-              <a:ext uri="{FF2B5EF4-FFF2-40B4-BE49-F238E27FC236}">
-                <a16:creationId xmlns:a16="http://schemas.microsoft.com/office/drawing/2014/main" xmlns="" id="{D874D08E-A43B-4D3A-946A-66F4440D6E79}"/>
-              </a:ext>
-            </a:extLst>
-          </p:cNvPr>
-          <p:cNvPicPr>
-            <a:picLocks noChangeAspect="1" noChangeArrowheads="1"/>
-          </p:cNvPicPr>
-          <p:nvPr/>
-        </p:nvPicPr>
-        <p:blipFill rotWithShape="1">
-          <a:blip r:embed="rId4" cstate="print"/>
-          <a:srcRect b="76906"/>
-          <a:stretch/>
-        </p:blipFill>
-        <p:spPr bwMode="auto">
-          <a:xfrm>
-            <a:off x="6660232" y="121283"/>
-            <a:ext cx="2411760" cy="1206791"/>
-          </a:xfrm>
-          <a:prstGeom prst="rect">
-            <a:avLst/>
-          </a:prstGeom>
-          <a:noFill/>
-        </p:spPr>
-      </p:pic>
-      <p:pic>
-        <p:nvPicPr>
-          <p:cNvPr id="10" name="Picture 3" descr="C:\Users\murrutiam\Pictures\bot\1626125963261.jpg">
-            <a:extLst>
-              <a:ext uri="{FF2B5EF4-FFF2-40B4-BE49-F238E27FC236}">
-                <a16:creationId xmlns:a16="http://schemas.microsoft.com/office/drawing/2014/main" xmlns="" id="{B2ACD810-CD02-44B7-ACF3-3A23D33C7F6A}"/>
-              </a:ext>
-            </a:extLst>
-          </p:cNvPr>
-          <p:cNvPicPr>
-            <a:picLocks noChangeAspect="1" noChangeArrowheads="1"/>
-          </p:cNvPicPr>
-          <p:nvPr/>
-        </p:nvPicPr>
-        <p:blipFill rotWithShape="1">
-          <a:blip r:embed="rId4" cstate="print"/>
-          <a:srcRect t="86074"/>
-          <a:stretch/>
-        </p:blipFill>
-        <p:spPr bwMode="auto">
-          <a:xfrm>
-            <a:off x="6692541" y="1289810"/>
-            <a:ext cx="2411760" cy="727693"/>
-          </a:xfrm>
-          <a:prstGeom prst="rect">
-            <a:avLst/>
-          </a:prstGeom>
-          <a:noFill/>
-        </p:spPr>
-      </p:pic>
-      <p:sp>
-        <p:nvSpPr>
-          <p:cNvPr id="11" name="Flecha: a la derecha 10">
-            <a:extLst>
-              <a:ext uri="{FF2B5EF4-FFF2-40B4-BE49-F238E27FC236}">
-                <a16:creationId xmlns:a16="http://schemas.microsoft.com/office/drawing/2014/main" xmlns="" id="{59C5259B-A7F6-4021-AC4D-A1FE02A50EC4}"/>
-              </a:ext>
-            </a:extLst>
-          </p:cNvPr>
-          <p:cNvSpPr/>
-          <p:nvPr/>
-        </p:nvSpPr>
-        <p:spPr>
-          <a:xfrm>
-            <a:off x="6252542" y="1496197"/>
-            <a:ext cx="1392769" cy="188536"/>
-          </a:xfrm>
-          <a:prstGeom prst="rightArrow">
-            <a:avLst>
-              <a:gd name="adj1" fmla="val 29955"/>
-              <a:gd name="adj2" fmla="val 50000"/>
-            </a:avLst>
-          </a:prstGeom>
-          <a:solidFill>
-            <a:schemeClr val="accent1"/>
-          </a:solidFill>
-          <a:ln>
-            <a:solidFill>
-              <a:schemeClr val="accent1"/>
-            </a:solidFill>
-          </a:ln>
-        </p:spPr>
-        <p:style>
-          <a:lnRef idx="2">
-            <a:schemeClr val="accent1">
-              <a:shade val="50000"/>
-            </a:schemeClr>
-          </a:lnRef>
-          <a:fillRef idx="1">
-            <a:schemeClr val="accent1"/>
-          </a:fillRef>
-          <a:effectRef idx="0">
-            <a:schemeClr val="accent1"/>
-          </a:effectRef>
-          <a:fontRef idx="minor">
-            <a:schemeClr val="lt1"/>
-          </a:fontRef>
-        </p:style>
-        <p:txBody>
-          <a:bodyPr rtlCol="0" anchor="ctr"/>
-          <a:lstStyle/>
-          <a:p>
-            <a:pPr algn="ctr"/>
-            <a:endParaRPr lang="es-CL" b="1" dirty="0">
-              <a:ln w="22225">
-                <a:solidFill>
-                  <a:schemeClr val="accent2"/>
-                </a:solidFill>
-                <a:prstDash val="solid"/>
-              </a:ln>
-              <a:solidFill>
-                <a:schemeClr val="accent2">
-                  <a:lumMod val="40000"/>
-                  <a:lumOff val="60000"/>
-                </a:schemeClr>
-              </a:solidFill>
-            </a:endParaRPr>
-          </a:p>
-        </p:txBody>
-      </p:sp>
-      <p:pic>
-        <p:nvPicPr>
-          <p:cNvPr id="19" name="Picture 4" descr="C:\Users\murrutiam\Pictures\bot\1626125963253.jpg">
-            <a:extLst>
-              <a:ext uri="{FF2B5EF4-FFF2-40B4-BE49-F238E27FC236}">
-                <a16:creationId xmlns:a16="http://schemas.microsoft.com/office/drawing/2014/main" xmlns="" id="{1F2F7875-B2E3-4F88-BBDD-C286E206AD3C}"/>
-              </a:ext>
-            </a:extLst>
-          </p:cNvPr>
-          <p:cNvPicPr>
-            <a:picLocks noChangeAspect="1" noChangeArrowheads="1"/>
-          </p:cNvPicPr>
-          <p:nvPr/>
-        </p:nvPicPr>
-        <p:blipFill rotWithShape="1">
-          <a:blip r:embed="rId5" cstate="print"/>
-          <a:srcRect b="90338"/>
-          <a:stretch/>
-        </p:blipFill>
-        <p:spPr bwMode="auto">
-          <a:xfrm>
-            <a:off x="109846" y="2119342"/>
-            <a:ext cx="2373922" cy="496962"/>
-          </a:xfrm>
-          <a:prstGeom prst="rect">
-            <a:avLst/>
-          </a:prstGeom>
-          <a:noFill/>
-        </p:spPr>
-      </p:pic>
-      <p:pic>
-        <p:nvPicPr>
-          <p:cNvPr id="20" name="Picture 4" descr="C:\Users\murrutiam\Pictures\bot\1626125963253.jpg">
-            <a:extLst>
-              <a:ext uri="{FF2B5EF4-FFF2-40B4-BE49-F238E27FC236}">
-                <a16:creationId xmlns:a16="http://schemas.microsoft.com/office/drawing/2014/main" xmlns="" id="{6604E97F-379A-47AA-93AB-02295B924137}"/>
-              </a:ext>
-            </a:extLst>
-          </p:cNvPr>
-          <p:cNvPicPr>
-            <a:picLocks noChangeAspect="1" noChangeArrowheads="1"/>
-          </p:cNvPicPr>
-          <p:nvPr/>
-        </p:nvPicPr>
-        <p:blipFill rotWithShape="1">
-          <a:blip r:embed="rId5" cstate="print"/>
-          <a:srcRect t="74609"/>
-          <a:stretch/>
-        </p:blipFill>
-        <p:spPr bwMode="auto">
-          <a:xfrm>
-            <a:off x="109846" y="2615145"/>
-            <a:ext cx="2373922" cy="1305990"/>
-          </a:xfrm>
-          <a:prstGeom prst="rect">
-            <a:avLst/>
-          </a:prstGeom>
-          <a:noFill/>
-        </p:spPr>
-      </p:pic>
-      <p:sp>
-        <p:nvSpPr>
-          <p:cNvPr id="21" name="Flecha: a la derecha 20">
-            <a:extLst>
-              <a:ext uri="{FF2B5EF4-FFF2-40B4-BE49-F238E27FC236}">
-                <a16:creationId xmlns:a16="http://schemas.microsoft.com/office/drawing/2014/main" xmlns="" id="{C764974B-D023-4589-BCC4-3E6FE93199F0}"/>
-              </a:ext>
-            </a:extLst>
-          </p:cNvPr>
-          <p:cNvSpPr/>
-          <p:nvPr/>
-        </p:nvSpPr>
-        <p:spPr>
-          <a:xfrm rot="10364854">
-            <a:off x="1124789" y="2894476"/>
-            <a:ext cx="1797064" cy="198164"/>
-          </a:xfrm>
-          <a:prstGeom prst="rightArrow">
-            <a:avLst>
-              <a:gd name="adj1" fmla="val 29955"/>
-              <a:gd name="adj2" fmla="val 50000"/>
-            </a:avLst>
-          </a:prstGeom>
-          <a:solidFill>
-            <a:schemeClr val="accent1"/>
-          </a:solidFill>
-          <a:ln>
-            <a:solidFill>
-              <a:schemeClr val="accent1"/>
-            </a:solidFill>
-          </a:ln>
-        </p:spPr>
-        <p:style>
-          <a:lnRef idx="2">
-            <a:schemeClr val="accent1">
-              <a:shade val="50000"/>
-            </a:schemeClr>
-          </a:lnRef>
-          <a:fillRef idx="1">
-            <a:schemeClr val="accent1"/>
-          </a:fillRef>
-          <a:effectRef idx="0">
-            <a:schemeClr val="accent1"/>
-          </a:effectRef>
-          <a:fontRef idx="minor">
-            <a:schemeClr val="lt1"/>
-          </a:fontRef>
-        </p:style>
-        <p:txBody>
-          <a:bodyPr rtlCol="0" anchor="ctr"/>
-          <a:lstStyle/>
-          <a:p>
-            <a:pPr algn="ctr"/>
-            <a:endParaRPr lang="es-CL" b="1" dirty="0">
-              <a:ln w="22225">
-                <a:solidFill>
-                  <a:schemeClr val="accent2"/>
-                </a:solidFill>
-                <a:prstDash val="solid"/>
-              </a:ln>
-              <a:solidFill>
-                <a:schemeClr val="accent2">
-                  <a:lumMod val="40000"/>
-                  <a:lumOff val="60000"/>
-                </a:schemeClr>
-              </a:solidFill>
-            </a:endParaRPr>
-          </a:p>
-        </p:txBody>
-      </p:sp>
-      <p:pic>
-        <p:nvPicPr>
-          <p:cNvPr id="15" name="Imagen 14" descr="Interfaz de usuario gráfica, Texto, Aplicación&#10;&#10;Descripción generada automáticamente">
-            <a:extLst>
-              <a:ext uri="{FF2B5EF4-FFF2-40B4-BE49-F238E27FC236}">
-                <a16:creationId xmlns:a16="http://schemas.microsoft.com/office/drawing/2014/main" xmlns="" id="{81BED82B-714D-4692-AB63-A2D8F461C261}"/>
-              </a:ext>
-            </a:extLst>
-          </p:cNvPr>
-          <p:cNvPicPr>
-            <a:picLocks noChangeAspect="1"/>
-          </p:cNvPicPr>
-          <p:nvPr/>
-        </p:nvPicPr>
-        <p:blipFill rotWithShape="1">
-          <a:blip r:embed="rId6" cstate="print">
-            <a:extLst>
-              <a:ext uri="{28A0092B-C50C-407E-A947-70E740481C1C}">
-                <a14:useLocalDpi xmlns:a14="http://schemas.microsoft.com/office/drawing/2010/main" xmlns="" val="0"/>
-              </a:ext>
-            </a:extLst>
-          </a:blip>
-          <a:srcRect t="40495" b="29176"/>
-          <a:stretch/>
-        </p:blipFill>
-        <p:spPr>
-          <a:xfrm>
-            <a:off x="6228184" y="2135274"/>
-            <a:ext cx="2849089" cy="1872208"/>
-          </a:xfrm>
-          <a:prstGeom prst="rect">
-            <a:avLst/>
-          </a:prstGeom>
-        </p:spPr>
-      </p:pic>
-      <p:sp>
-        <p:nvSpPr>
-          <p:cNvPr id="17" name="Flecha: a la derecha 16">
-            <a:extLst>
-              <a:ext uri="{FF2B5EF4-FFF2-40B4-BE49-F238E27FC236}">
-                <a16:creationId xmlns:a16="http://schemas.microsoft.com/office/drawing/2014/main" xmlns="" id="{4527AA8F-6BFB-4785-9CBE-E39EE356594F}"/>
-              </a:ext>
-            </a:extLst>
-          </p:cNvPr>
-          <p:cNvSpPr/>
-          <p:nvPr/>
-        </p:nvSpPr>
-        <p:spPr>
-          <a:xfrm rot="20795414">
-            <a:off x="5001894" y="3230338"/>
-            <a:ext cx="1360953" cy="240651"/>
-          </a:xfrm>
-          <a:prstGeom prst="rightArrow">
-            <a:avLst>
-              <a:gd name="adj1" fmla="val 29955"/>
-              <a:gd name="adj2" fmla="val 50000"/>
-            </a:avLst>
-          </a:prstGeom>
-          <a:solidFill>
-            <a:schemeClr val="accent1"/>
-          </a:solidFill>
-          <a:ln>
-            <a:solidFill>
-              <a:schemeClr val="accent1"/>
-            </a:solidFill>
-          </a:ln>
-        </p:spPr>
-        <p:style>
-          <a:lnRef idx="2">
-            <a:schemeClr val="accent1">
-              <a:shade val="50000"/>
-            </a:schemeClr>
-          </a:lnRef>
-          <a:fillRef idx="1">
-            <a:schemeClr val="accent1"/>
-          </a:fillRef>
-          <a:effectRef idx="0">
-            <a:schemeClr val="accent1"/>
-          </a:effectRef>
-          <a:fontRef idx="minor">
-            <a:schemeClr val="lt1"/>
-          </a:fontRef>
-        </p:style>
-        <p:txBody>
-          <a:bodyPr rtlCol="0" anchor="ctr"/>
-          <a:lstStyle/>
-          <a:p>
-            <a:pPr algn="ctr"/>
-            <a:endParaRPr lang="es-CL" b="1" dirty="0">
-              <a:ln w="22225">
-                <a:solidFill>
-                  <a:schemeClr val="accent2"/>
-                </a:solidFill>
-                <a:prstDash val="solid"/>
-              </a:ln>
-              <a:solidFill>
-                <a:schemeClr val="accent2">
-                  <a:lumMod val="40000"/>
-                  <a:lumOff val="60000"/>
-                </a:schemeClr>
-              </a:solidFill>
-            </a:endParaRPr>
-          </a:p>
-        </p:txBody>
-      </p:sp>
-      <p:sp>
-        <p:nvSpPr>
-          <p:cNvPr id="23" name="Flecha: a la derecha 22">
-            <a:extLst>
-              <a:ext uri="{FF2B5EF4-FFF2-40B4-BE49-F238E27FC236}">
-                <a16:creationId xmlns:a16="http://schemas.microsoft.com/office/drawing/2014/main" xmlns="" id="{673D0113-A10F-49C9-87C0-52C9A16ADD94}"/>
-              </a:ext>
-            </a:extLst>
-          </p:cNvPr>
-          <p:cNvSpPr/>
-          <p:nvPr/>
-        </p:nvSpPr>
-        <p:spPr>
-          <a:xfrm rot="21232833">
-            <a:off x="4653450" y="4098072"/>
-            <a:ext cx="1690461" cy="196602"/>
-          </a:xfrm>
-          <a:prstGeom prst="rightArrow">
-            <a:avLst>
-              <a:gd name="adj1" fmla="val 29955"/>
-              <a:gd name="adj2" fmla="val 50000"/>
-            </a:avLst>
-          </a:prstGeom>
-          <a:solidFill>
-            <a:schemeClr val="accent1"/>
-          </a:solidFill>
-          <a:ln>
-            <a:solidFill>
-              <a:schemeClr val="accent1"/>
-            </a:solidFill>
-          </a:ln>
-        </p:spPr>
-        <p:style>
-          <a:lnRef idx="2">
-            <a:schemeClr val="accent1">
-              <a:shade val="50000"/>
-            </a:schemeClr>
-          </a:lnRef>
-          <a:fillRef idx="1">
-            <a:schemeClr val="accent1"/>
-          </a:fillRef>
-          <a:effectRef idx="0">
-            <a:schemeClr val="accent1"/>
-          </a:effectRef>
-          <a:fontRef idx="minor">
-            <a:schemeClr val="lt1"/>
-          </a:fontRef>
-        </p:style>
-        <p:txBody>
-          <a:bodyPr rtlCol="0" anchor="ctr"/>
-          <a:lstStyle/>
-          <a:p>
-            <a:pPr algn="ctr"/>
-            <a:endParaRPr lang="es-CL" b="1" dirty="0">
-              <a:ln w="22225">
-                <a:solidFill>
-                  <a:schemeClr val="accent2"/>
-                </a:solidFill>
-                <a:prstDash val="solid"/>
-              </a:ln>
-              <a:solidFill>
-                <a:schemeClr val="accent2">
-                  <a:lumMod val="40000"/>
-                  <a:lumOff val="60000"/>
-                </a:schemeClr>
-              </a:solidFill>
-            </a:endParaRPr>
-          </a:p>
-        </p:txBody>
-      </p:sp>
-      <p:sp>
-        <p:nvSpPr>
-          <p:cNvPr id="24" name="CuadroTexto 23">
-            <a:extLst>
-              <a:ext uri="{FF2B5EF4-FFF2-40B4-BE49-F238E27FC236}">
-                <a16:creationId xmlns:a16="http://schemas.microsoft.com/office/drawing/2014/main" xmlns="" id="{4C885A81-C4FF-405E-957F-A3447F703C6D}"/>
-              </a:ext>
-            </a:extLst>
-          </p:cNvPr>
-          <p:cNvSpPr txBox="1"/>
-          <p:nvPr/>
-        </p:nvSpPr>
-        <p:spPr>
-          <a:xfrm>
-            <a:off x="3131840" y="4083918"/>
-            <a:ext cx="2304256" cy="615553"/>
-          </a:xfrm>
-          <a:prstGeom prst="rect">
-            <a:avLst/>
-          </a:prstGeom>
-          <a:ln>
-            <a:solidFill>
-              <a:schemeClr val="tx2">
-                <a:lumMod val="60000"/>
-                <a:lumOff val="40000"/>
-              </a:schemeClr>
-            </a:solidFill>
-          </a:ln>
-        </p:spPr>
-        <p:style>
-          <a:lnRef idx="2">
-            <a:schemeClr val="accent1">
-              <a:shade val="50000"/>
-            </a:schemeClr>
-          </a:lnRef>
-          <a:fillRef idx="1">
-            <a:schemeClr val="accent1"/>
-          </a:fillRef>
-          <a:effectRef idx="0">
-            <a:schemeClr val="accent1"/>
-          </a:effectRef>
-          <a:fontRef idx="minor">
-            <a:schemeClr val="lt1"/>
-          </a:fontRef>
-        </p:style>
-        <p:txBody>
-          <a:bodyPr wrap="square" rtlCol="0">
-            <a:spAutoFit/>
-          </a:bodyPr>
-          <a:lstStyle/>
-          <a:p>
-            <a:r>
-              <a:rPr lang="es-MX" dirty="0"/>
-              <a:t>5.- </a:t>
-            </a:r>
-            <a:r>
-              <a:rPr lang="es-MX" sz="1600" dirty="0"/>
-              <a:t>Esperar el mensaje de confirmación y listo</a:t>
-            </a:r>
-            <a:endParaRPr lang="es-CL" dirty="0"/>
-          </a:p>
-        </p:txBody>
-      </p:sp>
-      <p:sp>
-        <p:nvSpPr>
-          <p:cNvPr id="7" name="CuadroTexto 6">
-            <a:extLst>
-              <a:ext uri="{FF2B5EF4-FFF2-40B4-BE49-F238E27FC236}">
-                <a16:creationId xmlns:a16="http://schemas.microsoft.com/office/drawing/2014/main" xmlns="" id="{C61E4412-DD05-434E-AF1F-4307A29D33F1}"/>
-              </a:ext>
-            </a:extLst>
-          </p:cNvPr>
-          <p:cNvSpPr txBox="1"/>
-          <p:nvPr/>
-        </p:nvSpPr>
-        <p:spPr>
-          <a:xfrm>
-            <a:off x="2712018" y="150757"/>
-            <a:ext cx="3240360" cy="830997"/>
-          </a:xfrm>
-          <a:prstGeom prst="rect">
-            <a:avLst/>
-          </a:prstGeom>
-          <a:ln>
-            <a:solidFill>
-              <a:schemeClr val="tx2">
-                <a:lumMod val="60000"/>
-                <a:lumOff val="40000"/>
-              </a:schemeClr>
-            </a:solidFill>
-          </a:ln>
-        </p:spPr>
-        <p:style>
-          <a:lnRef idx="2">
-            <a:schemeClr val="accent1">
-              <a:shade val="50000"/>
-            </a:schemeClr>
-          </a:lnRef>
-          <a:fillRef idx="1">
-            <a:schemeClr val="accent1"/>
-          </a:fillRef>
-          <a:effectRef idx="0">
-            <a:schemeClr val="accent1"/>
-          </a:effectRef>
-          <a:fontRef idx="minor">
-            <a:schemeClr val="lt1"/>
-          </a:fontRef>
-        </p:style>
-        <p:txBody>
-          <a:bodyPr wrap="square" rtlCol="0">
-            <a:spAutoFit/>
-          </a:bodyPr>
-          <a:lstStyle/>
-          <a:p>
-            <a:r>
-              <a:rPr lang="es-MX" sz="1600" dirty="0"/>
-              <a:t>1.- En el cuadro de búsqueda, buscar el BOT </a:t>
-            </a:r>
-            <a:r>
-              <a:rPr lang="es-MX" sz="1600" dirty="0" smtClean="0"/>
-              <a:t>“</a:t>
-            </a:r>
-            <a:r>
-              <a:rPr lang="es-MX" sz="1600" b="1" dirty="0" smtClean="0">
-                <a:solidFill>
-                  <a:schemeClr val="tx1"/>
-                </a:solidFill>
-              </a:rPr>
-              <a:t>pamco</a:t>
-            </a:r>
-            <a:r>
-              <a:rPr lang="es-MX" sz="1600" b="1" dirty="0" smtClean="0">
-                <a:solidFill>
-                  <a:schemeClr val="bg1"/>
-                </a:solidFill>
-              </a:rPr>
-              <a:t>”</a:t>
-            </a:r>
-            <a:r>
-              <a:rPr lang="es-MX" sz="1600" dirty="0" smtClean="0"/>
-              <a:t> </a:t>
-            </a:r>
-            <a:r>
-              <a:rPr lang="es-MX" sz="1600" dirty="0"/>
-              <a:t>y seleccionar el que tiene el logo de </a:t>
-            </a:r>
-            <a:r>
-              <a:rPr lang="es-MX" sz="1600" u="sng" dirty="0"/>
-              <a:t>Ariztia</a:t>
-            </a:r>
-            <a:endParaRPr lang="es-CL" sz="1600" u="sng" dirty="0"/>
-          </a:p>
-        </p:txBody>
-      </p:sp>
-      <p:sp>
-        <p:nvSpPr>
-          <p:cNvPr id="14" name="CuadroTexto 13">
-            <a:extLst>
-              <a:ext uri="{FF2B5EF4-FFF2-40B4-BE49-F238E27FC236}">
-                <a16:creationId xmlns:a16="http://schemas.microsoft.com/office/drawing/2014/main" xmlns="" id="{A1B5D83D-6A24-4BE8-B0C4-256D5D96628B}"/>
-              </a:ext>
-            </a:extLst>
-          </p:cNvPr>
-          <p:cNvSpPr txBox="1"/>
-          <p:nvPr/>
-        </p:nvSpPr>
-        <p:spPr>
-          <a:xfrm>
-            <a:off x="3777795" y="1371172"/>
-            <a:ext cx="2522397" cy="615553"/>
-          </a:xfrm>
-          <a:prstGeom prst="rect">
-            <a:avLst/>
-          </a:prstGeom>
-          <a:ln>
-            <a:solidFill>
-              <a:schemeClr val="tx2">
-                <a:lumMod val="60000"/>
-                <a:lumOff val="40000"/>
-              </a:schemeClr>
-            </a:solidFill>
-          </a:ln>
-        </p:spPr>
-        <p:style>
-          <a:lnRef idx="2">
-            <a:schemeClr val="accent1">
-              <a:shade val="50000"/>
-            </a:schemeClr>
-          </a:lnRef>
-          <a:fillRef idx="1">
-            <a:schemeClr val="accent1"/>
-          </a:fillRef>
-          <a:effectRef idx="0">
-            <a:schemeClr val="accent1"/>
-          </a:effectRef>
-          <a:fontRef idx="minor">
-            <a:schemeClr val="lt1"/>
-          </a:fontRef>
-        </p:style>
-        <p:txBody>
           <a:bodyPr wrap="square" rtlCol="0">
             <a:spAutoFit/>
           </a:bodyPr>
@@ -5991,164 +5617,99 @@
       </p:sp>
       <p:sp>
         <p:nvSpPr>
-          <p:cNvPr id="22" name="CuadroTexto 21">
-            <a:extLst>
-              <a:ext uri="{FF2B5EF4-FFF2-40B4-BE49-F238E27FC236}">
-                <a16:creationId xmlns:a16="http://schemas.microsoft.com/office/drawing/2014/main" xmlns="" id="{CEE1EBF8-3C9F-48FB-B34F-B1AA4413D5DD}"/>
-              </a:ext>
-            </a:extLst>
-          </p:cNvPr>
-          <p:cNvSpPr txBox="1"/>
+          <p:cNvPr id="30" name="1 Título"/>
+          <p:cNvSpPr>
+            <a:spLocks noGrp="1"/>
+          </p:cNvSpPr>
+          <p:nvPr>
+            <p:ph type="title"/>
+          </p:nvPr>
+        </p:nvSpPr>
+        <p:spPr>
+          <a:xfrm>
+            <a:off x="457200" y="205979"/>
+            <a:ext cx="7931224" cy="857250"/>
+          </a:xfrm>
+        </p:spPr>
+        <p:txBody>
+          <a:bodyPr/>
+          <a:lstStyle/>
+          <a:p>
+            <a:r>
+              <a:rPr lang="es-CL" dirty="0" smtClean="0"/>
+              <a:t>Modo de Uso </a:t>
+            </a:r>
+            <a:r>
+              <a:rPr lang="es-CL" dirty="0" smtClean="0"/>
+              <a:t>Bot</a:t>
+            </a:r>
+            <a:r>
+              <a:rPr lang="es-CL" dirty="0" smtClean="0"/>
+              <a:t> </a:t>
+            </a:r>
+            <a:r>
+              <a:rPr lang="es-CL" dirty="0" smtClean="0"/>
+              <a:t>Telegram</a:t>
+            </a:r>
+            <a:endParaRPr lang="es-CL" dirty="0"/>
+          </a:p>
+        </p:txBody>
+      </p:sp>
+      <p:pic>
+        <p:nvPicPr>
+          <p:cNvPr id="2053" name="Picture 5"/>
+          <p:cNvPicPr>
+            <a:picLocks noChangeAspect="1" noChangeArrowheads="1"/>
+          </p:cNvPicPr>
           <p:nvPr/>
-        </p:nvSpPr>
-        <p:spPr>
-          <a:xfrm>
-            <a:off x="3131840" y="3363838"/>
-            <a:ext cx="2304256" cy="615553"/>
-          </a:xfrm>
-          <a:prstGeom prst="rect">
-            <a:avLst/>
+        </p:nvPicPr>
+        <p:blipFill>
+          <a:blip r:embed="rId3" cstate="print"/>
+          <a:srcRect/>
+          <a:stretch>
+            <a:fillRect/>
+          </a:stretch>
+        </p:blipFill>
+        <p:spPr bwMode="auto">
+          <a:xfrm>
+            <a:off x="5868144" y="2715766"/>
+            <a:ext cx="3024336" cy="1769797"/>
+          </a:xfrm>
+          <a:prstGeom prst="roundRect">
+            <a:avLst>
+              <a:gd name="adj" fmla="val 8594"/>
+            </a:avLst>
           </a:prstGeom>
+          <a:solidFill>
+            <a:srgbClr val="FFFFFF">
+              <a:shade val="85000"/>
+            </a:srgbClr>
+          </a:solidFill>
           <a:ln>
-            <a:solidFill>
-              <a:schemeClr val="tx2">
-                <a:lumMod val="60000"/>
-                <a:lumOff val="40000"/>
-              </a:schemeClr>
-            </a:solidFill>
+            <a:noFill/>
           </a:ln>
-        </p:spPr>
-        <p:style>
-          <a:lnRef idx="2">
-            <a:schemeClr val="accent1">
-              <a:shade val="50000"/>
-            </a:schemeClr>
-          </a:lnRef>
-          <a:fillRef idx="1">
-            <a:schemeClr val="accent1"/>
-          </a:fillRef>
-          <a:effectRef idx="0">
-            <a:schemeClr val="accent1"/>
-          </a:effectRef>
-          <a:fontRef idx="minor">
-            <a:schemeClr val="lt1"/>
-          </a:fontRef>
-        </p:style>
-        <p:txBody>
-          <a:bodyPr wrap="square" rtlCol="0">
-            <a:spAutoFit/>
-          </a:bodyPr>
-          <a:lstStyle/>
-          <a:p>
-            <a:r>
-              <a:rPr lang="es-MX" dirty="0"/>
-              <a:t>4.- </a:t>
-            </a:r>
-            <a:r>
-              <a:rPr lang="es-MX" sz="1600" dirty="0"/>
-              <a:t>Seleccionar </a:t>
-            </a:r>
-            <a:r>
-              <a:rPr lang="es-MX" sz="1600" b="1" dirty="0">
-                <a:solidFill>
-                  <a:schemeClr val="tx1"/>
-                </a:solidFill>
-              </a:rPr>
-              <a:t>/Agregar </a:t>
-            </a:r>
-            <a:r>
-              <a:rPr lang="es-MX" sz="1600" dirty="0"/>
-              <a:t>o escribirlo</a:t>
-            </a:r>
-            <a:endParaRPr lang="es-CL" dirty="0"/>
-          </a:p>
-        </p:txBody>
-      </p:sp>
-      <p:sp>
-        <p:nvSpPr>
-          <p:cNvPr id="18" name="CuadroTexto 17">
-            <a:extLst>
-              <a:ext uri="{FF2B5EF4-FFF2-40B4-BE49-F238E27FC236}">
-                <a16:creationId xmlns:a16="http://schemas.microsoft.com/office/drawing/2014/main" xmlns="" id="{8D5CAFCA-44DC-4FE3-AE59-CE3626C0AEA8}"/>
-              </a:ext>
-            </a:extLst>
-          </p:cNvPr>
-          <p:cNvSpPr txBox="1"/>
-          <p:nvPr/>
-        </p:nvSpPr>
-        <p:spPr>
-          <a:xfrm>
-            <a:off x="2627784" y="2643758"/>
-            <a:ext cx="2160240" cy="615553"/>
-          </a:xfrm>
-          <a:prstGeom prst="rect">
-            <a:avLst/>
-          </a:prstGeom>
-          <a:ln>
-            <a:solidFill>
-              <a:schemeClr val="tx2">
-                <a:lumMod val="60000"/>
-                <a:lumOff val="40000"/>
-              </a:schemeClr>
-            </a:solidFill>
-          </a:ln>
-        </p:spPr>
-        <p:style>
-          <a:lnRef idx="2">
-            <a:schemeClr val="accent1">
-              <a:shade val="50000"/>
-            </a:schemeClr>
-          </a:lnRef>
-          <a:fillRef idx="1">
-            <a:schemeClr val="accent1"/>
-          </a:fillRef>
-          <a:effectRef idx="0">
-            <a:schemeClr val="accent1"/>
-          </a:effectRef>
-          <a:fontRef idx="minor">
-            <a:schemeClr val="lt1"/>
-          </a:fontRef>
-        </p:style>
-        <p:txBody>
-          <a:bodyPr wrap="square" rtlCol="0">
-            <a:spAutoFit/>
-          </a:bodyPr>
-          <a:lstStyle/>
-          <a:p>
-            <a:r>
-              <a:rPr lang="es-MX" dirty="0"/>
-              <a:t>3.- </a:t>
-            </a:r>
-            <a:r>
-              <a:rPr lang="es-MX" sz="1600" dirty="0"/>
-              <a:t>Seleccionar </a:t>
-            </a:r>
-            <a:r>
-              <a:rPr lang="es-MX" sz="1600" b="1" dirty="0">
-                <a:solidFill>
-                  <a:schemeClr val="tx1"/>
-                </a:solidFill>
-              </a:rPr>
-              <a:t>/menú </a:t>
-            </a:r>
-            <a:r>
-              <a:rPr lang="es-MX" sz="1600" dirty="0"/>
-              <a:t>o escribirlo</a:t>
-            </a:r>
-            <a:endParaRPr lang="es-CL" dirty="0"/>
-          </a:p>
-        </p:txBody>
-      </p:sp>
+          <a:effectLst>
+            <a:reflection blurRad="12700" stA="38000" endPos="28000" dist="5000" dir="5400000" sy="-100000" algn="bl" rotWithShape="0"/>
+          </a:effectLst>
+        </p:spPr>
+      </p:pic>
     </p:spTree>
     <p:extLst>
       <p:ext uri="{BB962C8B-B14F-4D97-AF65-F5344CB8AC3E}">
-        <p14:creationId xmlns:p14="http://schemas.microsoft.com/office/powerpoint/2010/main" xmlns="" val="1456706445"/>
+        <p14:creationId xmlns="" xmlns:p14="http://schemas.microsoft.com/office/powerpoint/2010/main" val="1456706445"/>
       </p:ext>
     </p:extLst>
   </p:cSld>
   <p:clrMapOvr>
     <a:masterClrMapping/>
   </p:clrMapOvr>
+  <p:timing>
+    <p:tnLst>
+      <p:par>
+        <p:cTn id="1" dur="indefinite" restart="never" nodeType="tmRoot"/>
+      </p:par>
+    </p:tnLst>
+  </p:timing>
 </p:sld>
 </file>
 
@@ -6171,112 +5732,425 @@
       </p:grpSpPr>
       <p:sp>
         <p:nvSpPr>
-          <p:cNvPr id="2" name="1 Título"/>
-          <p:cNvSpPr>
-            <a:spLocks noGrp="1"/>
-          </p:cNvSpPr>
-          <p:nvPr>
-            <p:ph type="title"/>
-          </p:nvPr>
-        </p:nvSpPr>
-        <p:spPr>
-          <a:xfrm>
-            <a:off x="467544" y="339502"/>
-            <a:ext cx="8229600" cy="857250"/>
-          </a:xfrm>
-        </p:spPr>
+          <p:cNvPr id="2" name="1 Marcador de fecha"/>
+          <p:cNvSpPr>
+            <a:spLocks noGrp="1"/>
+          </p:cNvSpPr>
+          <p:nvPr>
+            <p:ph type="dt" sz="half" idx="10"/>
+          </p:nvPr>
+        </p:nvSpPr>
+        <p:spPr/>
         <p:txBody>
           <a:bodyPr/>
           <a:lstStyle/>
           <a:p>
-            <a:r>
-              <a:rPr lang="es-MX" dirty="0"/>
-              <a:t>CIERRE</a:t>
-            </a:r>
-          </a:p>
-        </p:txBody>
-      </p:sp>
-      <p:sp>
-        <p:nvSpPr>
-          <p:cNvPr id="3" name="2 Marcador de contenido"/>
-          <p:cNvSpPr>
-            <a:spLocks noGrp="1"/>
-          </p:cNvSpPr>
-          <p:nvPr>
-            <p:ph idx="1"/>
-          </p:nvPr>
-        </p:nvSpPr>
-        <p:spPr>
-          <a:xfrm>
-            <a:off x="457200" y="1923677"/>
-            <a:ext cx="8229600" cy="2670945"/>
-          </a:xfrm>
-        </p:spPr>
-        <p:txBody>
-          <a:bodyPr>
-            <a:normAutofit/>
-          </a:bodyPr>
-          <a:lstStyle/>
-          <a:p>
-            <a:r>
-              <a:rPr lang="es-MX" sz="2400" dirty="0"/>
-              <a:t>La aplicación esta sujeta a cambios sin previo </a:t>
-            </a:r>
-            <a:r>
-              <a:rPr lang="es-MX" sz="2400" dirty="0" smtClean="0"/>
-              <a:t>aviso, </a:t>
-            </a:r>
-            <a:r>
-              <a:rPr lang="es-MX" sz="2400" dirty="0"/>
-              <a:t>dado que aun esta en fase de </a:t>
-            </a:r>
-            <a:r>
-              <a:rPr lang="es-MX" sz="2400" dirty="0" smtClean="0"/>
-              <a:t>desarrollo</a:t>
-            </a:r>
-          </a:p>
-          <a:p>
-            <a:pPr>
-              <a:buNone/>
-            </a:pPr>
-            <a:endParaRPr lang="es-MX" sz="2400" dirty="0"/>
-          </a:p>
-        </p:txBody>
-      </p:sp>
-      <p:sp>
-        <p:nvSpPr>
-          <p:cNvPr id="4" name="3 Marcador de fecha"/>
-          <p:cNvSpPr>
-            <a:spLocks noGrp="1"/>
-          </p:cNvSpPr>
-          <p:nvPr>
-            <p:ph type="dt" sz="half" idx="10"/>
-          </p:nvPr>
-        </p:nvSpPr>
-        <p:spPr/>
-        <p:txBody>
-          <a:bodyPr/>
-          <a:lstStyle/>
-          <a:p>
-            <a:fld id="{D509CB46-7F35-4ED8-B4EB-7D2059EFAEEF}" type="datetime10">
+            <a:fld id="{AFB840BB-B73C-4455-8A7C-CC1F135B5E2A}" type="datetime10">
               <a:rPr lang="es-CL" smtClean="0"/>
               <a:pPr/>
-              <a:t>10:23</a:t>
+              <a:t>14:43</a:t>
             </a:fld>
             <a:endParaRPr lang="es-CL" dirty="0"/>
           </a:p>
         </p:txBody>
       </p:sp>
+      <p:sp>
+        <p:nvSpPr>
+          <p:cNvPr id="3" name="CuadroTexto 23">
+            <a:extLst>
+              <a:ext uri="{FF2B5EF4-FFF2-40B4-BE49-F238E27FC236}">
+                <a16:creationId xmlns="" xmlns:a16="http://schemas.microsoft.com/office/drawing/2014/main" id="{4C885A81-C4FF-405E-957F-A3447F703C6D}"/>
+              </a:ext>
+            </a:extLst>
+          </p:cNvPr>
+          <p:cNvSpPr txBox="1"/>
+          <p:nvPr/>
+        </p:nvSpPr>
+        <p:spPr>
+          <a:xfrm>
+            <a:off x="3851920" y="3474888"/>
+            <a:ext cx="2304256" cy="681038"/>
+          </a:xfrm>
+          <a:prstGeom prst="roundRect">
+            <a:avLst/>
+          </a:prstGeom>
+          <a:ln/>
+        </p:spPr>
+        <p:style>
+          <a:lnRef idx="0">
+            <a:schemeClr val="accent1"/>
+          </a:lnRef>
+          <a:fillRef idx="3">
+            <a:schemeClr val="accent1"/>
+          </a:fillRef>
+          <a:effectRef idx="3">
+            <a:schemeClr val="accent1"/>
+          </a:effectRef>
+          <a:fontRef idx="minor">
+            <a:schemeClr val="lt1"/>
+          </a:fontRef>
+        </p:style>
+        <p:txBody>
+          <a:bodyPr wrap="square" rtlCol="0">
+            <a:spAutoFit/>
+          </a:bodyPr>
+          <a:lstStyle/>
+          <a:p>
+            <a:r>
+              <a:rPr lang="es-MX" dirty="0"/>
+              <a:t>5.- </a:t>
+            </a:r>
+            <a:r>
+              <a:rPr lang="es-MX" sz="1600" dirty="0"/>
+              <a:t>Esperar el mensaje de confirmación y listo</a:t>
+            </a:r>
+            <a:endParaRPr lang="es-CL" dirty="0"/>
+          </a:p>
+        </p:txBody>
+      </p:sp>
+      <p:sp>
+        <p:nvSpPr>
+          <p:cNvPr id="4" name="CuadroTexto 21">
+            <a:extLst>
+              <a:ext uri="{FF2B5EF4-FFF2-40B4-BE49-F238E27FC236}">
+                <a16:creationId xmlns="" xmlns:a16="http://schemas.microsoft.com/office/drawing/2014/main" id="{CEE1EBF8-3C9F-48FB-B34F-B1AA4413D5DD}"/>
+              </a:ext>
+            </a:extLst>
+          </p:cNvPr>
+          <p:cNvSpPr txBox="1"/>
+          <p:nvPr/>
+        </p:nvSpPr>
+        <p:spPr>
+          <a:xfrm>
+            <a:off x="3851920" y="2571750"/>
+            <a:ext cx="2304256" cy="681038"/>
+          </a:xfrm>
+          <a:prstGeom prst="roundRect">
+            <a:avLst/>
+          </a:prstGeom>
+          <a:ln/>
+        </p:spPr>
+        <p:style>
+          <a:lnRef idx="0">
+            <a:schemeClr val="accent1"/>
+          </a:lnRef>
+          <a:fillRef idx="3">
+            <a:schemeClr val="accent1"/>
+          </a:fillRef>
+          <a:effectRef idx="3">
+            <a:schemeClr val="accent1"/>
+          </a:effectRef>
+          <a:fontRef idx="minor">
+            <a:schemeClr val="lt1"/>
+          </a:fontRef>
+        </p:style>
+        <p:txBody>
+          <a:bodyPr wrap="square" rtlCol="0">
+            <a:spAutoFit/>
+          </a:bodyPr>
+          <a:lstStyle/>
+          <a:p>
+            <a:r>
+              <a:rPr lang="es-MX" dirty="0"/>
+              <a:t>4.- </a:t>
+            </a:r>
+            <a:r>
+              <a:rPr lang="es-MX" sz="1600" dirty="0"/>
+              <a:t>Seleccionar </a:t>
+            </a:r>
+            <a:r>
+              <a:rPr lang="es-MX" sz="1600" b="1" dirty="0">
+                <a:solidFill>
+                  <a:schemeClr val="tx1"/>
+                </a:solidFill>
+              </a:rPr>
+              <a:t>/Agregar </a:t>
+            </a:r>
+            <a:r>
+              <a:rPr lang="es-MX" sz="1600" dirty="0"/>
+              <a:t>o escribirlo</a:t>
+            </a:r>
+            <a:endParaRPr lang="es-CL" dirty="0"/>
+          </a:p>
+        </p:txBody>
+      </p:sp>
+      <p:sp>
+        <p:nvSpPr>
+          <p:cNvPr id="5" name="CuadroTexto 17">
+            <a:extLst>
+              <a:ext uri="{FF2B5EF4-FFF2-40B4-BE49-F238E27FC236}">
+                <a16:creationId xmlns="" xmlns:a16="http://schemas.microsoft.com/office/drawing/2014/main" id="{8D5CAFCA-44DC-4FE3-AE59-CE3626C0AEA8}"/>
+              </a:ext>
+            </a:extLst>
+          </p:cNvPr>
+          <p:cNvSpPr txBox="1"/>
+          <p:nvPr/>
+        </p:nvSpPr>
+        <p:spPr>
+          <a:xfrm>
+            <a:off x="3347864" y="1347614"/>
+            <a:ext cx="2160240" cy="681038"/>
+          </a:xfrm>
+          <a:prstGeom prst="roundRect">
+            <a:avLst/>
+          </a:prstGeom>
+          <a:ln/>
+        </p:spPr>
+        <p:style>
+          <a:lnRef idx="0">
+            <a:schemeClr val="accent1"/>
+          </a:lnRef>
+          <a:fillRef idx="3">
+            <a:schemeClr val="accent1"/>
+          </a:fillRef>
+          <a:effectRef idx="3">
+            <a:schemeClr val="accent1"/>
+          </a:effectRef>
+          <a:fontRef idx="minor">
+            <a:schemeClr val="lt1"/>
+          </a:fontRef>
+        </p:style>
+        <p:txBody>
+          <a:bodyPr wrap="square" rtlCol="0">
+            <a:spAutoFit/>
+          </a:bodyPr>
+          <a:lstStyle/>
+          <a:p>
+            <a:r>
+              <a:rPr lang="es-MX" dirty="0"/>
+              <a:t>3.- </a:t>
+            </a:r>
+            <a:r>
+              <a:rPr lang="es-MX" sz="1600" dirty="0"/>
+              <a:t>Seleccionar </a:t>
+            </a:r>
+            <a:r>
+              <a:rPr lang="es-MX" sz="1600" b="1" dirty="0">
+                <a:solidFill>
+                  <a:schemeClr val="tx1"/>
+                </a:solidFill>
+              </a:rPr>
+              <a:t>/menú </a:t>
+            </a:r>
+            <a:r>
+              <a:rPr lang="es-MX" sz="1600" dirty="0"/>
+              <a:t>o escribirlo</a:t>
+            </a:r>
+            <a:endParaRPr lang="es-CL" dirty="0"/>
+          </a:p>
+        </p:txBody>
+      </p:sp>
+      <p:sp>
+        <p:nvSpPr>
+          <p:cNvPr id="9" name="1 Título"/>
+          <p:cNvSpPr txBox="1">
+            <a:spLocks/>
+          </p:cNvSpPr>
+          <p:nvPr/>
+        </p:nvSpPr>
+        <p:spPr>
+          <a:xfrm>
+            <a:off x="457200" y="274340"/>
+            <a:ext cx="7931224" cy="857250"/>
+          </a:xfrm>
+          <a:prstGeom prst="rect">
+            <a:avLst/>
+          </a:prstGeom>
+        </p:spPr>
+        <p:txBody>
+          <a:bodyPr/>
+          <a:lstStyle/>
+          <a:p>
+            <a:pPr marL="0" marR="0" lvl="0" indent="0" algn="ctr" defTabSz="914400" rtl="0" eaLnBrk="1" fontAlgn="auto" latinLnBrk="0" hangingPunct="1">
+              <a:lnSpc>
+                <a:spcPct val="100000"/>
+              </a:lnSpc>
+              <a:spcBef>
+                <a:spcPct val="0"/>
+              </a:spcBef>
+              <a:spcAft>
+                <a:spcPts val="0"/>
+              </a:spcAft>
+              <a:buClrTx/>
+              <a:buSzTx/>
+              <a:buFontTx/>
+              <a:buNone/>
+              <a:tabLst/>
+              <a:defRPr/>
+            </a:pPr>
+            <a:r>
+              <a:rPr kumimoji="0" lang="es-CL" sz="4400" b="0" i="0" u="none" strike="noStrike" kern="1200" cap="none" spc="0" normalizeH="0" baseline="0" noProof="0" dirty="0" smtClean="0">
+                <a:ln>
+                  <a:noFill/>
+                </a:ln>
+                <a:solidFill>
+                  <a:schemeClr val="tx1"/>
+                </a:solidFill>
+                <a:effectLst/>
+                <a:uLnTx/>
+                <a:uFillTx/>
+                <a:latin typeface="+mj-lt"/>
+                <a:ea typeface="+mj-ea"/>
+                <a:cs typeface="+mj-cs"/>
+              </a:rPr>
+              <a:t>Modo de Uso </a:t>
+            </a:r>
+            <a:r>
+              <a:rPr kumimoji="0" lang="es-CL" sz="4400" b="0" i="0" u="none" strike="noStrike" kern="1200" cap="none" spc="0" normalizeH="0" baseline="0" noProof="0" dirty="0" smtClean="0">
+                <a:ln>
+                  <a:noFill/>
+                </a:ln>
+                <a:solidFill>
+                  <a:schemeClr val="tx1"/>
+                </a:solidFill>
+                <a:effectLst/>
+                <a:uLnTx/>
+                <a:uFillTx/>
+                <a:latin typeface="+mj-lt"/>
+                <a:ea typeface="+mj-ea"/>
+                <a:cs typeface="+mj-cs"/>
+              </a:rPr>
+              <a:t>Bot</a:t>
+            </a:r>
+            <a:r>
+              <a:rPr kumimoji="0" lang="es-CL" sz="4400" b="0" i="0" u="none" strike="noStrike" kern="1200" cap="none" spc="0" normalizeH="0" baseline="0" noProof="0" dirty="0" smtClean="0">
+                <a:ln>
+                  <a:noFill/>
+                </a:ln>
+                <a:solidFill>
+                  <a:schemeClr val="tx1"/>
+                </a:solidFill>
+                <a:effectLst/>
+                <a:uLnTx/>
+                <a:uFillTx/>
+                <a:latin typeface="+mj-lt"/>
+                <a:ea typeface="+mj-ea"/>
+                <a:cs typeface="+mj-cs"/>
+              </a:rPr>
+              <a:t> </a:t>
+            </a:r>
+            <a:r>
+              <a:rPr kumimoji="0" lang="es-CL" sz="4400" b="0" i="0" u="none" strike="noStrike" kern="1200" cap="none" spc="0" normalizeH="0" baseline="0" noProof="0" dirty="0" smtClean="0">
+                <a:ln>
+                  <a:noFill/>
+                </a:ln>
+                <a:solidFill>
+                  <a:schemeClr val="tx1"/>
+                </a:solidFill>
+                <a:effectLst/>
+                <a:uLnTx/>
+                <a:uFillTx/>
+                <a:latin typeface="+mj-lt"/>
+                <a:ea typeface="+mj-ea"/>
+                <a:cs typeface="+mj-cs"/>
+              </a:rPr>
+              <a:t>Telegram</a:t>
+            </a:r>
+            <a:endParaRPr kumimoji="0" lang="es-CL" sz="4400" b="0" i="0" u="none" strike="noStrike" kern="1200" cap="none" spc="0" normalizeH="0" baseline="0" noProof="0" dirty="0">
+              <a:ln>
+                <a:noFill/>
+              </a:ln>
+              <a:solidFill>
+                <a:schemeClr val="tx1"/>
+              </a:solidFill>
+              <a:effectLst/>
+              <a:uLnTx/>
+              <a:uFillTx/>
+              <a:latin typeface="+mj-lt"/>
+              <a:ea typeface="+mj-ea"/>
+              <a:cs typeface="+mj-cs"/>
+            </a:endParaRPr>
+          </a:p>
+        </p:txBody>
+      </p:sp>
+      <p:pic>
+        <p:nvPicPr>
+          <p:cNvPr id="4098" name="Picture 2"/>
+          <p:cNvPicPr>
+            <a:picLocks noChangeAspect="1" noChangeArrowheads="1"/>
+          </p:cNvPicPr>
+          <p:nvPr/>
+        </p:nvPicPr>
+        <p:blipFill>
+          <a:blip r:embed="rId2" cstate="print"/>
+          <a:srcRect/>
+          <a:stretch>
+            <a:fillRect/>
+          </a:stretch>
+        </p:blipFill>
+        <p:spPr bwMode="auto">
+          <a:xfrm>
+            <a:off x="251520" y="1275606"/>
+            <a:ext cx="3015208" cy="1435016"/>
+          </a:xfrm>
+          <a:prstGeom prst="roundRect">
+            <a:avLst>
+              <a:gd name="adj" fmla="val 8594"/>
+            </a:avLst>
+          </a:prstGeom>
+          <a:solidFill>
+            <a:srgbClr val="FFFFFF">
+              <a:shade val="85000"/>
+            </a:srgbClr>
+          </a:solidFill>
+          <a:ln>
+            <a:noFill/>
+          </a:ln>
+          <a:effectLst>
+            <a:reflection blurRad="12700" stA="38000" endPos="28000" dist="5000" dir="5400000" sy="-100000" algn="bl" rotWithShape="0"/>
+          </a:effectLst>
+        </p:spPr>
+      </p:pic>
+      <p:pic>
+        <p:nvPicPr>
+          <p:cNvPr id="4099" name="Picture 3"/>
+          <p:cNvPicPr>
+            <a:picLocks noChangeAspect="1" noChangeArrowheads="1"/>
+          </p:cNvPicPr>
+          <p:nvPr/>
+        </p:nvPicPr>
+        <p:blipFill>
+          <a:blip r:embed="rId3" cstate="print"/>
+          <a:srcRect/>
+          <a:stretch>
+            <a:fillRect/>
+          </a:stretch>
+        </p:blipFill>
+        <p:spPr bwMode="auto">
+          <a:xfrm>
+            <a:off x="6228184" y="2211710"/>
+            <a:ext cx="2737890" cy="2328922"/>
+          </a:xfrm>
+          <a:prstGeom prst="roundRect">
+            <a:avLst>
+              <a:gd name="adj" fmla="val 6746"/>
+            </a:avLst>
+          </a:prstGeom>
+          <a:solidFill>
+            <a:srgbClr val="FFFFFF">
+              <a:shade val="85000"/>
+            </a:srgbClr>
+          </a:solidFill>
+          <a:ln>
+            <a:noFill/>
+          </a:ln>
+          <a:effectLst>
+            <a:reflection blurRad="12700" stA="38000" endPos="28000" dist="5000" dir="5400000" sy="-100000" algn="bl" rotWithShape="0"/>
+          </a:effectLst>
+        </p:spPr>
+      </p:pic>
     </p:spTree>
-    <p:extLst>
-      <p:ext uri="{BB962C8B-B14F-4D97-AF65-F5344CB8AC3E}">
-        <p14:creationId xmlns:p14="http://schemas.microsoft.com/office/powerpoint/2010/main" xmlns="" val="1911007108"/>
-      </p:ext>
-    </p:extLst>
   </p:cSld>
   <p:clrMapOvr>
     <a:masterClrMapping/>
   </p:clrMapOvr>
+  <p:timing>
+    <p:tnLst>
+      <p:par>
+        <p:cTn id="1" dur="indefinite" restart="never" nodeType="tmRoot"/>
+      </p:par>
+    </p:tnLst>
+  </p:timing>
 </p:sld>
 </file>
 
@@ -6299,174 +6173,129 @@
       </p:grpSpPr>
       <p:sp>
         <p:nvSpPr>
-          <p:cNvPr id="2" name="1 Título"/>
-          <p:cNvSpPr>
-            <a:spLocks noGrp="1"/>
-          </p:cNvSpPr>
-          <p:nvPr>
-            <p:ph type="title"/>
+          <p:cNvPr id="3" name="2 Marcador de contenido"/>
+          <p:cNvSpPr>
+            <a:spLocks noGrp="1"/>
+          </p:cNvSpPr>
+          <p:nvPr>
+            <p:ph idx="1"/>
           </p:nvPr>
         </p:nvSpPr>
         <p:spPr>
           <a:xfrm>
-            <a:off x="457200" y="571492"/>
-            <a:ext cx="8229600" cy="857250"/>
-          </a:xfrm>
-        </p:spPr>
-        <p:txBody>
-          <a:bodyPr/>
-          <a:lstStyle/>
-          <a:p>
-            <a:r>
-              <a:rPr lang="es-CL" dirty="0"/>
-              <a:t>FIN PRESENTACION</a:t>
-            </a:r>
-          </a:p>
-        </p:txBody>
-      </p:sp>
-      <p:sp>
-        <p:nvSpPr>
-          <p:cNvPr id="4" name="3 Marcador de fecha"/>
-          <p:cNvSpPr>
-            <a:spLocks noGrp="1"/>
-          </p:cNvSpPr>
-          <p:nvPr>
-            <p:ph type="dt" sz="half" idx="10"/>
-          </p:nvPr>
-        </p:nvSpPr>
-        <p:spPr/>
-        <p:txBody>
-          <a:bodyPr/>
-          <a:lstStyle/>
-          <a:p>
-            <a:fld id="{63E2D962-5AE3-40CF-95FD-860FC163C788}" type="datetime10">
-              <a:rPr lang="es-CL" smtClean="0"/>
-              <a:pPr/>
-              <a:t>11:30</a:t>
-            </a:fld>
-            <a:endParaRPr lang="es-CL" dirty="0"/>
-          </a:p>
-        </p:txBody>
-      </p:sp>
-      <p:pic>
-        <p:nvPicPr>
-          <p:cNvPr id="1026" name="Picture 2"/>
-          <p:cNvPicPr>
-            <a:picLocks noChangeAspect="1" noChangeArrowheads="1"/>
-          </p:cNvPicPr>
+            <a:off x="457200" y="1923677"/>
+            <a:ext cx="8229600" cy="2670945"/>
+          </a:xfrm>
+        </p:spPr>
+        <p:txBody>
+          <a:bodyPr>
+            <a:normAutofit/>
+          </a:bodyPr>
+          <a:lstStyle/>
+          <a:p>
+            <a:r>
+              <a:rPr lang="es-MX" sz="2400" dirty="0"/>
+              <a:t>La aplicación esta sujeta a cambios sin previo </a:t>
+            </a:r>
+            <a:r>
+              <a:rPr lang="es-MX" sz="2400" dirty="0" smtClean="0"/>
+              <a:t>aviso, </a:t>
+            </a:r>
+            <a:r>
+              <a:rPr lang="es-MX" sz="2400" dirty="0"/>
+              <a:t>dado que aun esta en fase de </a:t>
+            </a:r>
+            <a:r>
+              <a:rPr lang="es-MX" sz="2400" dirty="0" smtClean="0"/>
+              <a:t>desarrollo</a:t>
+            </a:r>
+          </a:p>
+          <a:p>
+            <a:pPr>
+              <a:buNone/>
+            </a:pPr>
+            <a:endParaRPr lang="es-MX" sz="2400" dirty="0"/>
+          </a:p>
+        </p:txBody>
+      </p:sp>
+      <p:sp>
+        <p:nvSpPr>
+          <p:cNvPr id="6" name="1 Título"/>
+          <p:cNvSpPr txBox="1">
+            <a:spLocks/>
+          </p:cNvSpPr>
           <p:nvPr/>
-        </p:nvPicPr>
-        <p:blipFill rotWithShape="1">
-          <a:blip r:embed="rId2" cstate="print">
-            <a:extLst>
-              <a:ext uri="{28A0092B-C50C-407E-A947-70E740481C1C}">
-                <a14:useLocalDpi xmlns:a14="http://schemas.microsoft.com/office/drawing/2010/main" xmlns="" val="0"/>
-              </a:ext>
-            </a:extLst>
-          </a:blip>
-          <a:srcRect l="22389" r="17907"/>
-          <a:stretch/>
-        </p:blipFill>
-        <p:spPr bwMode="auto">
-          <a:xfrm>
-            <a:off x="-180528" y="3147815"/>
-            <a:ext cx="9721080" cy="2160239"/>
+        </p:nvSpPr>
+        <p:spPr>
+          <a:xfrm>
+            <a:off x="457200" y="205979"/>
+            <a:ext cx="7931224" cy="857250"/>
           </a:xfrm>
           <a:prstGeom prst="rect">
             <a:avLst/>
           </a:prstGeom>
-          <a:ln>
-            <a:noFill/>
-          </a:ln>
-          <a:effectLst>
-            <a:softEdge rad="112500"/>
-          </a:effectLst>
-          <a:extLst>
-            <a:ext uri="{909E8E84-426E-40DD-AFC4-6F175D3DCCD1}">
-              <a14:hiddenFill xmlns:a14="http://schemas.microsoft.com/office/drawing/2010/main" xmlns="">
-                <a:solidFill>
-                  <a:schemeClr val="accent1"/>
-                </a:solidFill>
-              </a14:hiddenFill>
-            </a:ext>
-            <a:ext uri="{91240B29-F687-4F45-9708-019B960494DF}">
-              <a14:hiddenLine xmlns:a14="http://schemas.microsoft.com/office/drawing/2010/main" xmlns="" w="9525">
+        </p:spPr>
+        <p:txBody>
+          <a:bodyPr/>
+          <a:lstStyle/>
+          <a:p>
+            <a:pPr marL="0" marR="0" lvl="0" indent="0" algn="ctr" defTabSz="914400" rtl="0" eaLnBrk="1" fontAlgn="auto" latinLnBrk="0" hangingPunct="1">
+              <a:lnSpc>
+                <a:spcPct val="100000"/>
+              </a:lnSpc>
+              <a:spcBef>
+                <a:spcPct val="0"/>
+              </a:spcBef>
+              <a:spcAft>
+                <a:spcPts val="0"/>
+              </a:spcAft>
+              <a:buClrTx/>
+              <a:buSzTx/>
+              <a:buFontTx/>
+              <a:buNone/>
+              <a:tabLst/>
+              <a:defRPr/>
+            </a:pPr>
+            <a:r>
+              <a:rPr kumimoji="0" lang="es-CL" sz="4400" b="0" i="0" u="none" strike="noStrike" kern="1200" cap="none" spc="0" normalizeH="0" baseline="0" noProof="0" dirty="0" smtClean="0">
+                <a:ln>
+                  <a:noFill/>
+                </a:ln>
                 <a:solidFill>
                   <a:schemeClr val="tx1"/>
                 </a:solidFill>
-                <a:miter lim="800000"/>
-                <a:headEnd/>
-                <a:tailEnd/>
-              </a14:hiddenLine>
-            </a:ext>
-          </a:extLst>
-        </p:spPr>
-      </p:pic>
-      <p:pic>
-        <p:nvPicPr>
-          <p:cNvPr id="1029" name="Picture 5"/>
-          <p:cNvPicPr>
-            <a:picLocks noChangeAspect="1" noChangeArrowheads="1"/>
-          </p:cNvPicPr>
-          <p:nvPr/>
-        </p:nvPicPr>
-        <p:blipFill>
-          <a:blip r:embed="rId3" cstate="print">
-            <a:extLst>
-              <a:ext uri="{28A0092B-C50C-407E-A947-70E740481C1C}">
-                <a14:useLocalDpi xmlns:a14="http://schemas.microsoft.com/office/drawing/2010/main" xmlns="" val="0"/>
-              </a:ext>
-            </a:extLst>
-          </a:blip>
-          <a:srcRect/>
-          <a:stretch>
-            <a:fillRect/>
-          </a:stretch>
-        </p:blipFill>
-        <p:spPr bwMode="auto">
-          <a:xfrm>
-            <a:off x="-396552" y="1779662"/>
-            <a:ext cx="3106936" cy="3106936"/>
-          </a:xfrm>
-          <a:prstGeom prst="rect">
-            <a:avLst/>
-          </a:prstGeom>
-          <a:noFill/>
-          <a:ln>
-            <a:noFill/>
-          </a:ln>
-          <a:effectLst/>
-          <a:extLst>
-            <a:ext uri="{909E8E84-426E-40DD-AFC4-6F175D3DCCD1}">
-              <a14:hiddenFill xmlns:a14="http://schemas.microsoft.com/office/drawing/2010/main" xmlns="">
-                <a:solidFill>
-                  <a:schemeClr val="accent1"/>
-                </a:solidFill>
-              </a14:hiddenFill>
-            </a:ext>
-            <a:ext uri="{91240B29-F687-4F45-9708-019B960494DF}">
-              <a14:hiddenLine xmlns:a14="http://schemas.microsoft.com/office/drawing/2010/main" xmlns="" w="9525">
-                <a:solidFill>
-                  <a:schemeClr val="tx1"/>
-                </a:solidFill>
-                <a:miter lim="800000"/>
-                <a:headEnd/>
-                <a:tailEnd/>
-              </a14:hiddenLine>
-            </a:ext>
-            <a:ext uri="{AF507438-7753-43E0-B8FC-AC1667EBCBE1}">
-              <a14:hiddenEffects xmlns:a14="http://schemas.microsoft.com/office/drawing/2010/main" xmlns="">
-                <a:effectLst>
-                  <a:outerShdw dist="35921" dir="2700000" algn="ctr" rotWithShape="0">
-                    <a:schemeClr val="bg2"/>
-                  </a:outerShdw>
-                </a:effectLst>
-              </a14:hiddenEffects>
-            </a:ext>
-          </a:extLst>
-        </p:spPr>
-      </p:pic>
+                <a:effectLst/>
+                <a:uLnTx/>
+                <a:uFillTx/>
+                <a:latin typeface="+mj-lt"/>
+                <a:ea typeface="+mj-ea"/>
+                <a:cs typeface="+mj-cs"/>
+              </a:rPr>
+              <a:t>Cierre </a:t>
+            </a:r>
+            <a:endParaRPr kumimoji="0" lang="es-CL" sz="4400" b="0" i="0" u="none" strike="noStrike" kern="1200" cap="none" spc="0" normalizeH="0" baseline="0" noProof="0" dirty="0">
+              <a:ln>
+                <a:noFill/>
+              </a:ln>
+              <a:solidFill>
+                <a:schemeClr val="tx1"/>
+              </a:solidFill>
+              <a:effectLst/>
+              <a:uLnTx/>
+              <a:uFillTx/>
+              <a:latin typeface="+mj-lt"/>
+              <a:ea typeface="+mj-ea"/>
+              <a:cs typeface="+mj-cs"/>
+            </a:endParaRPr>
+          </a:p>
+        </p:txBody>
+      </p:sp>
     </p:spTree>
+    <p:extLst>
+      <p:ext uri="{BB962C8B-B14F-4D97-AF65-F5344CB8AC3E}">
+        <p14:creationId xmlns="" xmlns:p14="http://schemas.microsoft.com/office/powerpoint/2010/main" val="1911007108"/>
+      </p:ext>
+    </p:extLst>
   </p:cSld>
   <p:clrMapOvr>
     <a:masterClrMapping/>

</xml_diff>